<commit_message>
Split monitoring daemon into components, created spike Jmeter script, updated simulation python script, updated posted
</commit_message>
<xml_diff>
--- a/Documents/G7-a0_landscape-projectposter.pptx
+++ b/Documents/G7-a0_landscape-projectposter.pptx
@@ -104,6 +104,11 @@
       </a:defRPr>
     </a:lvl9pPr>
   </p:defaultTextStyle>
+  <p:extLst>
+    <p:ext uri="{EFAFB233-063F-42B5-8137-9DF3F51BA10A}">
+      <p15:sldGuideLst xmlns:p15="http://schemas.microsoft.com/office/powerpoint/2012/main"/>
+    </p:ext>
+  </p:extLst>
 </p:presentation>
 </file>
 
@@ -3460,8 +3465,8 @@
         </p:nvSpPr>
         <p:spPr>
           <a:xfrm>
-            <a:off x="1455480" y="6747120"/>
-            <a:ext cx="12273120" cy="2452680"/>
+            <a:off x="1455480" y="6752760"/>
+            <a:ext cx="12273120" cy="6094920"/>
           </a:xfrm>
           <a:prstGeom prst="rect">
             <a:avLst/>
@@ -3494,7 +3499,7 @@
       </p:sp>
       <p:sp>
         <p:nvSpPr>
-          <p:cNvPr id="47" name="PlaceHolder 5"/>
+          <p:cNvPr id="49" name="PlaceHolder 7"/>
           <p:cNvSpPr>
             <a:spLocks noGrp="1"/>
           </p:cNvSpPr>
@@ -3504,8 +3509,8 @@
         </p:nvSpPr>
         <p:spPr>
           <a:xfrm>
-            <a:off x="1455480" y="9785160"/>
-            <a:ext cx="12273120" cy="1148400"/>
+            <a:off x="1455480" y="13224960"/>
+            <a:ext cx="12273120" cy="1093680"/>
           </a:xfrm>
           <a:prstGeom prst="rect">
             <a:avLst/>
@@ -3540,7 +3545,7 @@
       </p:sp>
       <p:sp>
         <p:nvSpPr>
-          <p:cNvPr id="48" name="PlaceHolder 6"/>
+          <p:cNvPr id="50" name="PlaceHolder 8"/>
           <p:cNvSpPr>
             <a:spLocks noGrp="1"/>
           </p:cNvSpPr>
@@ -3550,8 +3555,8 @@
         </p:nvSpPr>
         <p:spPr>
           <a:xfrm>
-            <a:off x="1455480" y="11016360"/>
-            <a:ext cx="12273120" cy="2519640"/>
+            <a:off x="1455480" y="14520768"/>
+            <a:ext cx="12273120" cy="6011472"/>
           </a:xfrm>
           <a:prstGeom prst="rect">
             <a:avLst/>
@@ -3584,7 +3589,7 @@
       </p:sp>
       <p:sp>
         <p:nvSpPr>
-          <p:cNvPr id="49" name="PlaceHolder 7"/>
+          <p:cNvPr id="51" name="PlaceHolder 9"/>
           <p:cNvSpPr>
             <a:spLocks noGrp="1"/>
           </p:cNvSpPr>
@@ -3594,7 +3599,7 @@
         </p:nvSpPr>
         <p:spPr>
           <a:xfrm>
-            <a:off x="1455480" y="13783320"/>
+            <a:off x="1455480" y="20909520"/>
             <a:ext cx="12273120" cy="1093680"/>
           </a:xfrm>
           <a:prstGeom prst="rect">
@@ -3630,7 +3635,7 @@
       </p:sp>
       <p:sp>
         <p:nvSpPr>
-          <p:cNvPr id="50" name="PlaceHolder 8"/>
+          <p:cNvPr id="52" name="PlaceHolder 10"/>
           <p:cNvSpPr>
             <a:spLocks noGrp="1"/>
           </p:cNvSpPr>
@@ -3640,8 +3645,8 @@
         </p:nvSpPr>
         <p:spPr>
           <a:xfrm>
-            <a:off x="1455480" y="15121440"/>
-            <a:ext cx="12273120" cy="5410800"/>
+            <a:off x="1455480" y="22206600"/>
+            <a:ext cx="12273120" cy="6550560"/>
           </a:xfrm>
           <a:prstGeom prst="rect">
             <a:avLst/>
@@ -3674,7 +3679,7 @@
       </p:sp>
       <p:sp>
         <p:nvSpPr>
-          <p:cNvPr id="51" name="PlaceHolder 9"/>
+          <p:cNvPr id="53" name="PlaceHolder 11"/>
           <p:cNvSpPr>
             <a:spLocks noGrp="1"/>
           </p:cNvSpPr>
@@ -3684,7 +3689,7 @@
         </p:nvSpPr>
         <p:spPr>
           <a:xfrm>
-            <a:off x="1455480" y="20909520"/>
+            <a:off x="15264720" y="5450040"/>
             <a:ext cx="12273120" cy="1093680"/>
           </a:xfrm>
           <a:prstGeom prst="rect">
@@ -3720,7 +3725,7 @@
       </p:sp>
       <p:sp>
         <p:nvSpPr>
-          <p:cNvPr id="52" name="PlaceHolder 10"/>
+          <p:cNvPr id="54" name="PlaceHolder 12"/>
           <p:cNvSpPr>
             <a:spLocks noGrp="1"/>
           </p:cNvSpPr>
@@ -3730,8 +3735,8 @@
         </p:nvSpPr>
         <p:spPr>
           <a:xfrm>
-            <a:off x="1455480" y="22206600"/>
-            <a:ext cx="12273120" cy="6550560"/>
+            <a:off x="15264720" y="6747120"/>
+            <a:ext cx="12273120" cy="6100560"/>
           </a:xfrm>
           <a:prstGeom prst="rect">
             <a:avLst/>
@@ -3753,7 +3758,7 @@
               </a:spcBef>
               <a:buNone/>
             </a:pPr>
-            <a:endParaRPr lang="en-CA" sz="1800" b="0" strike="noStrike" spc="-1">
+            <a:endParaRPr lang="en-CA" sz="1800" b="0" strike="noStrike" spc="-1" dirty="0">
               <a:solidFill>
                 <a:srgbClr val="000000"/>
               </a:solidFill>
@@ -3764,7 +3769,7 @@
       </p:sp>
       <p:sp>
         <p:nvSpPr>
-          <p:cNvPr id="53" name="PlaceHolder 11"/>
+          <p:cNvPr id="55" name="PlaceHolder 13"/>
           <p:cNvSpPr>
             <a:spLocks noGrp="1"/>
           </p:cNvSpPr>
@@ -3774,7 +3779,7 @@
         </p:nvSpPr>
         <p:spPr>
           <a:xfrm>
-            <a:off x="15264720" y="5450040"/>
+            <a:off x="15264720" y="13224960"/>
             <a:ext cx="12273120" cy="1093680"/>
           </a:xfrm>
           <a:prstGeom prst="rect">
@@ -3810,7 +3815,7 @@
       </p:sp>
       <p:sp>
         <p:nvSpPr>
-          <p:cNvPr id="54" name="PlaceHolder 12"/>
+          <p:cNvPr id="56" name="PlaceHolder 14"/>
           <p:cNvSpPr>
             <a:spLocks noGrp="1"/>
           </p:cNvSpPr>
@@ -3820,8 +3825,8 @@
         </p:nvSpPr>
         <p:spPr>
           <a:xfrm>
-            <a:off x="15264720" y="6747120"/>
-            <a:ext cx="12273120" cy="6100560"/>
+            <a:off x="15264720" y="14522040"/>
+            <a:ext cx="12273120" cy="6010200"/>
           </a:xfrm>
           <a:prstGeom prst="rect">
             <a:avLst/>
@@ -3843,7 +3848,7 @@
               </a:spcBef>
               <a:buNone/>
             </a:pPr>
-            <a:endParaRPr lang="en-CA" sz="1800" b="0" strike="noStrike" spc="-1" dirty="0">
+            <a:endParaRPr lang="en-CA" sz="1800" b="0" strike="noStrike" spc="-1">
               <a:solidFill>
                 <a:srgbClr val="000000"/>
               </a:solidFill>
@@ -3854,7 +3859,7 @@
       </p:sp>
       <p:sp>
         <p:nvSpPr>
-          <p:cNvPr id="55" name="PlaceHolder 13"/>
+          <p:cNvPr id="57" name="PlaceHolder 15"/>
           <p:cNvSpPr>
             <a:spLocks noGrp="1"/>
           </p:cNvSpPr>
@@ -3864,7 +3869,7 @@
         </p:nvSpPr>
         <p:spPr>
           <a:xfrm>
-            <a:off x="15264720" y="13224960"/>
+            <a:off x="15264720" y="20909520"/>
             <a:ext cx="12273120" cy="1093680"/>
           </a:xfrm>
           <a:prstGeom prst="rect">
@@ -3900,7 +3905,7 @@
       </p:sp>
       <p:sp>
         <p:nvSpPr>
-          <p:cNvPr id="56" name="PlaceHolder 14"/>
+          <p:cNvPr id="58" name="PlaceHolder 16"/>
           <p:cNvSpPr>
             <a:spLocks noGrp="1"/>
           </p:cNvSpPr>
@@ -3910,8 +3915,8 @@
         </p:nvSpPr>
         <p:spPr>
           <a:xfrm>
-            <a:off x="15264720" y="14522040"/>
-            <a:ext cx="12273120" cy="6010200"/>
+            <a:off x="15264720" y="22206600"/>
+            <a:ext cx="12273120" cy="6550560"/>
           </a:xfrm>
           <a:prstGeom prst="rect">
             <a:avLst/>
@@ -3933,7 +3938,7 @@
               </a:spcBef>
               <a:buNone/>
             </a:pPr>
-            <a:endParaRPr lang="en-CA" sz="1800" b="0" strike="noStrike" spc="-1">
+            <a:endParaRPr lang="en-CA" sz="1800" b="0" strike="noStrike" spc="-1" dirty="0">
               <a:solidFill>
                 <a:srgbClr val="000000"/>
               </a:solidFill>
@@ -3944,7 +3949,7 @@
       </p:sp>
       <p:sp>
         <p:nvSpPr>
-          <p:cNvPr id="57" name="PlaceHolder 15"/>
+          <p:cNvPr id="59" name="PlaceHolder 17"/>
           <p:cNvSpPr>
             <a:spLocks noGrp="1"/>
           </p:cNvSpPr>
@@ -3954,7 +3959,7 @@
         </p:nvSpPr>
         <p:spPr>
           <a:xfrm>
-            <a:off x="15264720" y="20909520"/>
+            <a:off x="29029680" y="5450040"/>
             <a:ext cx="12273120" cy="1093680"/>
           </a:xfrm>
           <a:prstGeom prst="rect">
@@ -3990,7 +3995,7 @@
       </p:sp>
       <p:sp>
         <p:nvSpPr>
-          <p:cNvPr id="58" name="PlaceHolder 16"/>
+          <p:cNvPr id="60" name="PlaceHolder 18"/>
           <p:cNvSpPr>
             <a:spLocks noGrp="1"/>
           </p:cNvSpPr>
@@ -4000,8 +4005,8 @@
         </p:nvSpPr>
         <p:spPr>
           <a:xfrm>
-            <a:off x="15264720" y="22206600"/>
-            <a:ext cx="12273120" cy="6550560"/>
+            <a:off x="29029680" y="6747120"/>
+            <a:ext cx="12273120" cy="6100560"/>
           </a:xfrm>
           <a:prstGeom prst="rect">
             <a:avLst/>
@@ -4024,366 +4029,6 @@
               <a:buNone/>
             </a:pPr>
             <a:endParaRPr lang="en-CA" sz="1800" b="0" strike="noStrike" spc="-1">
-              <a:solidFill>
-                <a:srgbClr val="000000"/>
-              </a:solidFill>
-              <a:latin typeface="Arial"/>
-            </a:endParaRPr>
-          </a:p>
-        </p:txBody>
-      </p:sp>
-      <p:sp>
-        <p:nvSpPr>
-          <p:cNvPr id="59" name="PlaceHolder 17"/>
-          <p:cNvSpPr>
-            <a:spLocks noGrp="1"/>
-          </p:cNvSpPr>
-          <p:nvPr>
-            <p:ph/>
-          </p:nvPr>
-        </p:nvSpPr>
-        <p:spPr>
-          <a:xfrm>
-            <a:off x="29029680" y="5450040"/>
-            <a:ext cx="12273120" cy="1093680"/>
-          </a:xfrm>
-          <a:prstGeom prst="rect">
-            <a:avLst/>
-          </a:prstGeom>
-          <a:solidFill>
-            <a:srgbClr val="FF5757"/>
-          </a:solidFill>
-          <a:ln w="0">
-            <a:noFill/>
-          </a:ln>
-        </p:spPr>
-        <p:txBody>
-          <a:bodyPr lIns="365760" tIns="45000" rIns="90000" bIns="45000" anchor="ctr">
-            <a:noAutofit/>
-          </a:bodyPr>
-          <a:lstStyle/>
-          <a:p>
-            <a:pPr indent="0">
-              <a:spcBef>
-                <a:spcPts val="1417"/>
-              </a:spcBef>
-              <a:buNone/>
-            </a:pPr>
-            <a:endParaRPr lang="en-CA" sz="1800" b="0" strike="noStrike" spc="-1" dirty="0">
-              <a:solidFill>
-                <a:srgbClr val="000000"/>
-              </a:solidFill>
-              <a:latin typeface="Arial"/>
-            </a:endParaRPr>
-          </a:p>
-        </p:txBody>
-      </p:sp>
-      <p:sp>
-        <p:nvSpPr>
-          <p:cNvPr id="60" name="PlaceHolder 18"/>
-          <p:cNvSpPr>
-            <a:spLocks noGrp="1"/>
-          </p:cNvSpPr>
-          <p:nvPr>
-            <p:ph/>
-          </p:nvPr>
-        </p:nvSpPr>
-        <p:spPr>
-          <a:xfrm>
-            <a:off x="29029680" y="6747120"/>
-            <a:ext cx="12273120" cy="6100560"/>
-          </a:xfrm>
-          <a:prstGeom prst="rect">
-            <a:avLst/>
-          </a:prstGeom>
-          <a:noFill/>
-          <a:ln w="0">
-            <a:noFill/>
-          </a:ln>
-        </p:spPr>
-        <p:txBody>
-          <a:bodyPr lIns="365760" tIns="182880" rIns="90000" bIns="45000" anchor="t">
-            <a:noAutofit/>
-          </a:bodyPr>
-          <a:lstStyle/>
-          <a:p>
-            <a:pPr indent="0">
-              <a:spcBef>
-                <a:spcPts val="1417"/>
-              </a:spcBef>
-              <a:buNone/>
-            </a:pPr>
-            <a:endParaRPr lang="en-CA" sz="1800" b="0" strike="noStrike" spc="-1">
-              <a:solidFill>
-                <a:srgbClr val="000000"/>
-              </a:solidFill>
-              <a:latin typeface="Arial"/>
-            </a:endParaRPr>
-          </a:p>
-        </p:txBody>
-      </p:sp>
-      <p:sp>
-        <p:nvSpPr>
-          <p:cNvPr id="61" name="PlaceHolder 19"/>
-          <p:cNvSpPr>
-            <a:spLocks noGrp="1"/>
-          </p:cNvSpPr>
-          <p:nvPr>
-            <p:ph/>
-          </p:nvPr>
-        </p:nvSpPr>
-        <p:spPr>
-          <a:xfrm>
-            <a:off x="29029680" y="14491080"/>
-            <a:ext cx="12273120" cy="3333960"/>
-          </a:xfrm>
-          <a:prstGeom prst="rect">
-            <a:avLst/>
-          </a:prstGeom>
-          <a:noFill/>
-          <a:ln w="0">
-            <a:noFill/>
-          </a:ln>
-        </p:spPr>
-        <p:txBody>
-          <a:bodyPr lIns="365760" tIns="182880" rIns="90000" bIns="45000" anchor="t">
-            <a:noAutofit/>
-          </a:bodyPr>
-          <a:lstStyle/>
-          <a:p>
-            <a:pPr indent="0">
-              <a:spcBef>
-                <a:spcPts val="1417"/>
-              </a:spcBef>
-              <a:buNone/>
-            </a:pPr>
-            <a:endParaRPr lang="en-CA" sz="1800" b="0" strike="noStrike" spc="-1">
-              <a:solidFill>
-                <a:srgbClr val="000000"/>
-              </a:solidFill>
-              <a:latin typeface="Arial"/>
-            </a:endParaRPr>
-          </a:p>
-        </p:txBody>
-      </p:sp>
-      <p:sp>
-        <p:nvSpPr>
-          <p:cNvPr id="62" name="PlaceHolder 20"/>
-          <p:cNvSpPr>
-            <a:spLocks noGrp="1"/>
-          </p:cNvSpPr>
-          <p:nvPr>
-            <p:ph/>
-          </p:nvPr>
-        </p:nvSpPr>
-        <p:spPr>
-          <a:xfrm>
-            <a:off x="29029680" y="18108360"/>
-            <a:ext cx="12273120" cy="1093680"/>
-          </a:xfrm>
-          <a:prstGeom prst="rect">
-            <a:avLst/>
-          </a:prstGeom>
-          <a:solidFill>
-            <a:srgbClr val="FF5757"/>
-          </a:solidFill>
-          <a:ln w="0">
-            <a:noFill/>
-          </a:ln>
-        </p:spPr>
-        <p:txBody>
-          <a:bodyPr lIns="365760" tIns="45000" rIns="90000" bIns="45000" anchor="ctr">
-            <a:noAutofit/>
-          </a:bodyPr>
-          <a:lstStyle/>
-          <a:p>
-            <a:pPr indent="0">
-              <a:spcBef>
-                <a:spcPts val="1417"/>
-              </a:spcBef>
-              <a:buNone/>
-            </a:pPr>
-            <a:endParaRPr lang="en-CA" sz="1800" b="0" strike="noStrike" spc="-1">
-              <a:solidFill>
-                <a:srgbClr val="000000"/>
-              </a:solidFill>
-              <a:latin typeface="Arial"/>
-            </a:endParaRPr>
-          </a:p>
-        </p:txBody>
-      </p:sp>
-      <p:sp>
-        <p:nvSpPr>
-          <p:cNvPr id="63" name="PlaceHolder 21"/>
-          <p:cNvSpPr>
-            <a:spLocks noGrp="1"/>
-          </p:cNvSpPr>
-          <p:nvPr>
-            <p:ph/>
-          </p:nvPr>
-        </p:nvSpPr>
-        <p:spPr>
-          <a:xfrm>
-            <a:off x="29029680" y="19405440"/>
-            <a:ext cx="12273120" cy="3899880"/>
-          </a:xfrm>
-          <a:prstGeom prst="rect">
-            <a:avLst/>
-          </a:prstGeom>
-          <a:noFill/>
-          <a:ln w="0">
-            <a:noFill/>
-          </a:ln>
-        </p:spPr>
-        <p:txBody>
-          <a:bodyPr lIns="365760" tIns="182880" rIns="90000" bIns="45000" anchor="t">
-            <a:noAutofit/>
-          </a:bodyPr>
-          <a:lstStyle/>
-          <a:p>
-            <a:pPr indent="0">
-              <a:spcBef>
-                <a:spcPts val="1417"/>
-              </a:spcBef>
-              <a:buNone/>
-            </a:pPr>
-            <a:endParaRPr lang="en-CA" sz="1800" b="0" strike="noStrike" spc="-1">
-              <a:solidFill>
-                <a:srgbClr val="000000"/>
-              </a:solidFill>
-              <a:latin typeface="Arial"/>
-            </a:endParaRPr>
-          </a:p>
-        </p:txBody>
-      </p:sp>
-      <p:sp>
-        <p:nvSpPr>
-          <p:cNvPr id="64" name="PlaceHolder 22"/>
-          <p:cNvSpPr>
-            <a:spLocks noGrp="1"/>
-          </p:cNvSpPr>
-          <p:nvPr>
-            <p:ph/>
-          </p:nvPr>
-        </p:nvSpPr>
-        <p:spPr>
-          <a:xfrm>
-            <a:off x="29029680" y="23454720"/>
-            <a:ext cx="12273120" cy="1093680"/>
-          </a:xfrm>
-          <a:prstGeom prst="rect">
-            <a:avLst/>
-          </a:prstGeom>
-          <a:solidFill>
-            <a:srgbClr val="FF5757"/>
-          </a:solidFill>
-          <a:ln w="0">
-            <a:noFill/>
-          </a:ln>
-        </p:spPr>
-        <p:txBody>
-          <a:bodyPr lIns="365760" tIns="45000" rIns="90000" bIns="45000" anchor="ctr">
-            <a:noAutofit/>
-          </a:bodyPr>
-          <a:lstStyle/>
-          <a:p>
-            <a:pPr indent="0">
-              <a:spcBef>
-                <a:spcPts val="1417"/>
-              </a:spcBef>
-              <a:buNone/>
-            </a:pPr>
-            <a:endParaRPr lang="en-CA" sz="1800" b="0" strike="noStrike" spc="-1">
-              <a:solidFill>
-                <a:srgbClr val="000000"/>
-              </a:solidFill>
-              <a:latin typeface="Arial"/>
-            </a:endParaRPr>
-          </a:p>
-        </p:txBody>
-      </p:sp>
-      <p:sp>
-        <p:nvSpPr>
-          <p:cNvPr id="65" name="PlaceHolder 23"/>
-          <p:cNvSpPr>
-            <a:spLocks noGrp="1"/>
-          </p:cNvSpPr>
-          <p:nvPr>
-            <p:ph/>
-          </p:nvPr>
-        </p:nvSpPr>
-        <p:spPr>
-          <a:xfrm>
-            <a:off x="29029680" y="24751800"/>
-            <a:ext cx="12273120" cy="4005360"/>
-          </a:xfrm>
-          <a:prstGeom prst="rect">
-            <a:avLst/>
-          </a:prstGeom>
-          <a:noFill/>
-          <a:ln w="0">
-            <a:noFill/>
-          </a:ln>
-        </p:spPr>
-        <p:txBody>
-          <a:bodyPr lIns="365760" tIns="182880" rIns="90000" bIns="45000" anchor="t">
-            <a:noAutofit/>
-          </a:bodyPr>
-          <a:lstStyle/>
-          <a:p>
-            <a:pPr indent="0">
-              <a:spcBef>
-                <a:spcPts val="1417"/>
-              </a:spcBef>
-              <a:buNone/>
-            </a:pPr>
-            <a:endParaRPr lang="en-CA" sz="1800" b="0" strike="noStrike" spc="-1">
-              <a:solidFill>
-                <a:srgbClr val="000000"/>
-              </a:solidFill>
-              <a:latin typeface="Arial"/>
-            </a:endParaRPr>
-          </a:p>
-        </p:txBody>
-      </p:sp>
-      <p:sp>
-        <p:nvSpPr>
-          <p:cNvPr id="66" name="PlaceHolder 24"/>
-          <p:cNvSpPr>
-            <a:spLocks noGrp="1"/>
-          </p:cNvSpPr>
-          <p:nvPr>
-            <p:ph/>
-          </p:nvPr>
-        </p:nvSpPr>
-        <p:spPr>
-          <a:xfrm>
-            <a:off x="29029680" y="13275000"/>
-            <a:ext cx="12273120" cy="1036080"/>
-          </a:xfrm>
-          <a:prstGeom prst="rect">
-            <a:avLst/>
-          </a:prstGeom>
-          <a:solidFill>
-            <a:srgbClr val="FF5757"/>
-          </a:solidFill>
-          <a:ln w="0">
-            <a:noFill/>
-          </a:ln>
-        </p:spPr>
-        <p:txBody>
-          <a:bodyPr lIns="365760" tIns="45000" rIns="90000" bIns="45000" anchor="ctr">
-            <a:noAutofit/>
-          </a:bodyPr>
-          <a:lstStyle/>
-          <a:p>
-            <a:pPr indent="0">
-              <a:spcBef>
-                <a:spcPts val="1417"/>
-              </a:spcBef>
-              <a:buNone/>
-            </a:pPr>
-            <a:endParaRPr lang="en-CA" sz="1800" b="0" strike="noStrike" spc="-1" dirty="0">
               <a:solidFill>
                 <a:srgbClr val="000000"/>
               </a:solidFill>
@@ -4644,10 +4289,10 @@
       </p:sp>
       <p:sp>
         <p:nvSpPr>
-          <p:cNvPr id="9" name="Rectangle 8">
+          <p:cNvPr id="10" name="Rectangle 9">
             <a:extLst>
               <a:ext uri="{FF2B5EF4-FFF2-40B4-BE49-F238E27FC236}">
-                <a16:creationId xmlns:a16="http://schemas.microsoft.com/office/drawing/2014/main" id="{FE263F7D-CAF7-86EF-1A94-683B883C30AF}"/>
+                <a16:creationId xmlns:a16="http://schemas.microsoft.com/office/drawing/2014/main" id="{A062B166-6932-A770-D04B-71D68742D0F6}"/>
               </a:ext>
             </a:extLst>
           </p:cNvPr>
@@ -4656,8 +4301,8 @@
         </p:nvSpPr>
         <p:spPr>
           <a:xfrm>
-            <a:off x="1455480" y="9785160"/>
-            <a:ext cx="12273120" cy="983880"/>
+            <a:off x="1455480" y="13224024"/>
+            <a:ext cx="12273120" cy="920400"/>
           </a:xfrm>
           <a:prstGeom prst="rect">
             <a:avLst/>
@@ -4703,10 +4348,10 @@
       </p:sp>
       <p:sp>
         <p:nvSpPr>
-          <p:cNvPr id="10" name="Rectangle 9">
+          <p:cNvPr id="11" name="Rectangle 10">
             <a:extLst>
               <a:ext uri="{FF2B5EF4-FFF2-40B4-BE49-F238E27FC236}">
-                <a16:creationId xmlns:a16="http://schemas.microsoft.com/office/drawing/2014/main" id="{A062B166-6932-A770-D04B-71D68742D0F6}"/>
+                <a16:creationId xmlns:a16="http://schemas.microsoft.com/office/drawing/2014/main" id="{A0A52E04-4E5A-C376-B658-7C1F8C570C27}"/>
               </a:ext>
             </a:extLst>
           </p:cNvPr>
@@ -4715,8 +4360,8 @@
         </p:nvSpPr>
         <p:spPr>
           <a:xfrm>
-            <a:off x="1455480" y="13786200"/>
-            <a:ext cx="12273120" cy="920400"/>
+            <a:off x="29029680" y="5456709"/>
+            <a:ext cx="12273120" cy="919800"/>
           </a:xfrm>
           <a:prstGeom prst="rect">
             <a:avLst/>
@@ -4762,10 +4407,10 @@
       </p:sp>
       <p:sp>
         <p:nvSpPr>
-          <p:cNvPr id="11" name="Rectangle 10">
+          <p:cNvPr id="12" name="Rectangle 11">
             <a:extLst>
               <a:ext uri="{FF2B5EF4-FFF2-40B4-BE49-F238E27FC236}">
-                <a16:creationId xmlns:a16="http://schemas.microsoft.com/office/drawing/2014/main" id="{A0A52E04-4E5A-C376-B658-7C1F8C570C27}"/>
+                <a16:creationId xmlns:a16="http://schemas.microsoft.com/office/drawing/2014/main" id="{799D936B-BE14-75BD-CF20-50C833150C81}"/>
               </a:ext>
             </a:extLst>
           </p:cNvPr>
@@ -4774,14 +4419,14 @@
         </p:nvSpPr>
         <p:spPr>
           <a:xfrm>
-            <a:off x="29029680" y="5456709"/>
-            <a:ext cx="12273120" cy="919800"/>
+            <a:off x="-1" y="4971798"/>
+            <a:ext cx="42803763" cy="164082"/>
           </a:xfrm>
           <a:prstGeom prst="rect">
             <a:avLst/>
           </a:prstGeom>
           <a:solidFill>
-            <a:srgbClr val="595959"/>
+            <a:srgbClr val="FF5757"/>
           </a:solidFill>
           <a:ln>
             <a:noFill/>
@@ -4808,23 +4453,16 @@
           <a:lstStyle/>
           <a:p>
             <a:pPr algn="ctr"/>
-            <a:endParaRPr lang="en-US">
-              <a:solidFill>
-                <a:schemeClr val="tx2">
-                  <a:lumMod val="25000"/>
-                  <a:lumOff val="75000"/>
-                </a:schemeClr>
-              </a:solidFill>
-            </a:endParaRPr>
-          </a:p>
-        </p:txBody>
-      </p:sp>
-      <p:sp>
-        <p:nvSpPr>
-          <p:cNvPr id="12" name="Rectangle 11">
+            <a:endParaRPr lang="en-US"/>
+          </a:p>
+        </p:txBody>
+      </p:sp>
+      <p:sp>
+        <p:nvSpPr>
+          <p:cNvPr id="14" name="Rectangle 13">
             <a:extLst>
               <a:ext uri="{FF2B5EF4-FFF2-40B4-BE49-F238E27FC236}">
-                <a16:creationId xmlns:a16="http://schemas.microsoft.com/office/drawing/2014/main" id="{799D936B-BE14-75BD-CF20-50C833150C81}"/>
+                <a16:creationId xmlns:a16="http://schemas.microsoft.com/office/drawing/2014/main" id="{49E78ADC-5B04-D58F-8136-3E496E9E2025}"/>
               </a:ext>
             </a:extLst>
           </p:cNvPr>
@@ -4833,14 +4471,14 @@
         </p:nvSpPr>
         <p:spPr>
           <a:xfrm>
-            <a:off x="-1" y="4971798"/>
-            <a:ext cx="42803763" cy="164082"/>
+            <a:off x="15264720" y="13224960"/>
+            <a:ext cx="12273120" cy="919800"/>
           </a:xfrm>
           <a:prstGeom prst="rect">
             <a:avLst/>
           </a:prstGeom>
           <a:solidFill>
-            <a:srgbClr val="FF5757"/>
+            <a:srgbClr val="595959"/>
           </a:solidFill>
           <a:ln>
             <a:noFill/>
@@ -4867,16 +4505,23 @@
           <a:lstStyle/>
           <a:p>
             <a:pPr algn="ctr"/>
-            <a:endParaRPr lang="en-US"/>
-          </a:p>
-        </p:txBody>
-      </p:sp>
-      <p:sp>
-        <p:nvSpPr>
-          <p:cNvPr id="13" name="Rectangle 12">
+            <a:endParaRPr lang="en-US">
+              <a:solidFill>
+                <a:schemeClr val="tx2">
+                  <a:lumMod val="25000"/>
+                  <a:lumOff val="75000"/>
+                </a:schemeClr>
+              </a:solidFill>
+            </a:endParaRPr>
+          </a:p>
+        </p:txBody>
+      </p:sp>
+      <p:sp>
+        <p:nvSpPr>
+          <p:cNvPr id="15" name="Rectangle 14">
             <a:extLst>
               <a:ext uri="{FF2B5EF4-FFF2-40B4-BE49-F238E27FC236}">
-                <a16:creationId xmlns:a16="http://schemas.microsoft.com/office/drawing/2014/main" id="{DD53593C-A0A1-BD71-4BDF-80181B68DBE0}"/>
+                <a16:creationId xmlns:a16="http://schemas.microsoft.com/office/drawing/2014/main" id="{A3C4ED14-87EE-8CFC-C270-EF37262C5B00}"/>
               </a:ext>
             </a:extLst>
           </p:cNvPr>
@@ -4885,8 +4530,8 @@
         </p:nvSpPr>
         <p:spPr>
           <a:xfrm>
-            <a:off x="29029680" y="13275000"/>
-            <a:ext cx="12273120" cy="869760"/>
+            <a:off x="1455480" y="20919210"/>
+            <a:ext cx="12273120" cy="920400"/>
           </a:xfrm>
           <a:prstGeom prst="rect">
             <a:avLst/>
@@ -4932,10 +4577,10 @@
       </p:sp>
       <p:sp>
         <p:nvSpPr>
-          <p:cNvPr id="14" name="Rectangle 13">
+          <p:cNvPr id="16" name="Rectangle 15">
             <a:extLst>
               <a:ext uri="{FF2B5EF4-FFF2-40B4-BE49-F238E27FC236}">
-                <a16:creationId xmlns:a16="http://schemas.microsoft.com/office/drawing/2014/main" id="{49E78ADC-5B04-D58F-8136-3E496E9E2025}"/>
+                <a16:creationId xmlns:a16="http://schemas.microsoft.com/office/drawing/2014/main" id="{32E39BE6-CD54-2E37-9DF3-B1D89E0C9D98}"/>
               </a:ext>
             </a:extLst>
           </p:cNvPr>
@@ -4944,8 +4589,8 @@
         </p:nvSpPr>
         <p:spPr>
           <a:xfrm>
-            <a:off x="15264720" y="13224960"/>
-            <a:ext cx="12273120" cy="919800"/>
+            <a:off x="15264720" y="20909520"/>
+            <a:ext cx="12273120" cy="920400"/>
           </a:xfrm>
           <a:prstGeom prst="rect">
             <a:avLst/>
@@ -4991,10 +4636,788 @@
       </p:sp>
       <p:sp>
         <p:nvSpPr>
-          <p:cNvPr id="15" name="Rectangle 14">
+          <p:cNvPr id="19" name="TextBox 18">
             <a:extLst>
               <a:ext uri="{FF2B5EF4-FFF2-40B4-BE49-F238E27FC236}">
-                <a16:creationId xmlns:a16="http://schemas.microsoft.com/office/drawing/2014/main" id="{A3C4ED14-87EE-8CFC-C270-EF37262C5B00}"/>
+                <a16:creationId xmlns:a16="http://schemas.microsoft.com/office/drawing/2014/main" id="{6689A257-2B7B-AB39-AEB7-8F3B74D28E4E}"/>
+              </a:ext>
+            </a:extLst>
+          </p:cNvPr>
+          <p:cNvSpPr txBox="1"/>
+          <p:nvPr/>
+        </p:nvSpPr>
+        <p:spPr>
+          <a:xfrm>
+            <a:off x="4467840" y="5620828"/>
+            <a:ext cx="6248400" cy="646331"/>
+          </a:xfrm>
+          <a:prstGeom prst="rect">
+            <a:avLst/>
+          </a:prstGeom>
+          <a:noFill/>
+        </p:spPr>
+        <p:txBody>
+          <a:bodyPr wrap="square" rtlCol="0">
+            <a:spAutoFit/>
+          </a:bodyPr>
+          <a:lstStyle/>
+          <a:p>
+            <a:pPr algn="ctr"/>
+            <a:r>
+              <a:rPr lang="en-US" sz="3600" dirty="0">
+                <a:solidFill>
+                  <a:schemeClr val="bg1">
+                    <a:lumMod val="95000"/>
+                  </a:schemeClr>
+                </a:solidFill>
+                <a:latin typeface="Times New Roman" panose="02020603050405020304" pitchFamily="18" charset="0"/>
+                <a:cs typeface="Times New Roman" panose="02020603050405020304" pitchFamily="18" charset="0"/>
+              </a:rPr>
+              <a:t>Problem Statement</a:t>
+            </a:r>
+          </a:p>
+        </p:txBody>
+      </p:sp>
+      <p:sp>
+        <p:nvSpPr>
+          <p:cNvPr id="20" name="TextBox 19">
+            <a:extLst>
+              <a:ext uri="{FF2B5EF4-FFF2-40B4-BE49-F238E27FC236}">
+                <a16:creationId xmlns:a16="http://schemas.microsoft.com/office/drawing/2014/main" id="{8D4AAACB-9920-6117-78E2-E14CA7AAF371}"/>
+              </a:ext>
+            </a:extLst>
+          </p:cNvPr>
+          <p:cNvSpPr txBox="1"/>
+          <p:nvPr/>
+        </p:nvSpPr>
+        <p:spPr>
+          <a:xfrm>
+            <a:off x="18277080" y="5596045"/>
+            <a:ext cx="6248400" cy="646331"/>
+          </a:xfrm>
+          <a:prstGeom prst="rect">
+            <a:avLst/>
+          </a:prstGeom>
+          <a:noFill/>
+        </p:spPr>
+        <p:txBody>
+          <a:bodyPr wrap="square" rtlCol="0">
+            <a:spAutoFit/>
+          </a:bodyPr>
+          <a:lstStyle/>
+          <a:p>
+            <a:pPr algn="ctr"/>
+            <a:r>
+              <a:rPr lang="en-US" sz="3600" dirty="0">
+                <a:solidFill>
+                  <a:schemeClr val="bg1">
+                    <a:lumMod val="95000"/>
+                  </a:schemeClr>
+                </a:solidFill>
+                <a:latin typeface="Times New Roman" panose="02020603050405020304" pitchFamily="18" charset="0"/>
+                <a:cs typeface="Times New Roman" panose="02020603050405020304" pitchFamily="18" charset="0"/>
+              </a:rPr>
+              <a:t>Motivation</a:t>
+            </a:r>
+          </a:p>
+        </p:txBody>
+      </p:sp>
+      <p:sp>
+        <p:nvSpPr>
+          <p:cNvPr id="22" name="TextBox 21">
+            <a:extLst>
+              <a:ext uri="{FF2B5EF4-FFF2-40B4-BE49-F238E27FC236}">
+                <a16:creationId xmlns:a16="http://schemas.microsoft.com/office/drawing/2014/main" id="{A0D85028-A175-46DC-E15D-CE3C60C0EC7F}"/>
+              </a:ext>
+            </a:extLst>
+          </p:cNvPr>
+          <p:cNvSpPr txBox="1"/>
+          <p:nvPr/>
+        </p:nvSpPr>
+        <p:spPr>
+          <a:xfrm>
+            <a:off x="18277080" y="13363904"/>
+            <a:ext cx="6248400" cy="646331"/>
+          </a:xfrm>
+          <a:prstGeom prst="rect">
+            <a:avLst/>
+          </a:prstGeom>
+          <a:noFill/>
+        </p:spPr>
+        <p:txBody>
+          <a:bodyPr wrap="square" rtlCol="0">
+            <a:spAutoFit/>
+          </a:bodyPr>
+          <a:lstStyle/>
+          <a:p>
+            <a:pPr algn="ctr"/>
+            <a:r>
+              <a:rPr lang="en-US" sz="3600" dirty="0">
+                <a:solidFill>
+                  <a:schemeClr val="bg1">
+                    <a:lumMod val="95000"/>
+                  </a:schemeClr>
+                </a:solidFill>
+                <a:latin typeface="Times New Roman" panose="02020603050405020304" pitchFamily="18" charset="0"/>
+                <a:cs typeface="Times New Roman" panose="02020603050405020304" pitchFamily="18" charset="0"/>
+              </a:rPr>
+              <a:t>Proposed Framework</a:t>
+            </a:r>
+          </a:p>
+        </p:txBody>
+      </p:sp>
+      <p:sp>
+        <p:nvSpPr>
+          <p:cNvPr id="23" name="TextBox 22">
+            <a:extLst>
+              <a:ext uri="{FF2B5EF4-FFF2-40B4-BE49-F238E27FC236}">
+                <a16:creationId xmlns:a16="http://schemas.microsoft.com/office/drawing/2014/main" id="{B3FF5BE7-6BC9-127E-4BAB-DE2098BFACAA}"/>
+              </a:ext>
+            </a:extLst>
+          </p:cNvPr>
+          <p:cNvSpPr txBox="1"/>
+          <p:nvPr/>
+        </p:nvSpPr>
+        <p:spPr>
+          <a:xfrm>
+            <a:off x="32087523" y="5586385"/>
+            <a:ext cx="6248400" cy="646331"/>
+          </a:xfrm>
+          <a:prstGeom prst="rect">
+            <a:avLst/>
+          </a:prstGeom>
+          <a:noFill/>
+        </p:spPr>
+        <p:txBody>
+          <a:bodyPr wrap="square" rtlCol="0">
+            <a:spAutoFit/>
+          </a:bodyPr>
+          <a:lstStyle/>
+          <a:p>
+            <a:pPr algn="ctr"/>
+            <a:r>
+              <a:rPr lang="en-US" sz="3600" dirty="0">
+                <a:solidFill>
+                  <a:schemeClr val="bg1">
+                    <a:lumMod val="95000"/>
+                  </a:schemeClr>
+                </a:solidFill>
+                <a:latin typeface="Times New Roman" panose="02020603050405020304" pitchFamily="18" charset="0"/>
+                <a:cs typeface="Times New Roman" panose="02020603050405020304" pitchFamily="18" charset="0"/>
+              </a:rPr>
+              <a:t>MAKE-K</a:t>
+            </a:r>
+          </a:p>
+        </p:txBody>
+      </p:sp>
+      <p:sp>
+        <p:nvSpPr>
+          <p:cNvPr id="24" name="TextBox 23">
+            <a:extLst>
+              <a:ext uri="{FF2B5EF4-FFF2-40B4-BE49-F238E27FC236}">
+                <a16:creationId xmlns:a16="http://schemas.microsoft.com/office/drawing/2014/main" id="{E13DAA02-DDB4-C002-F42E-15C20B7EB10E}"/>
+              </a:ext>
+            </a:extLst>
+          </p:cNvPr>
+          <p:cNvSpPr txBox="1"/>
+          <p:nvPr/>
+        </p:nvSpPr>
+        <p:spPr>
+          <a:xfrm>
+            <a:off x="4385940" y="13386714"/>
+            <a:ext cx="6248400" cy="646331"/>
+          </a:xfrm>
+          <a:prstGeom prst="rect">
+            <a:avLst/>
+          </a:prstGeom>
+          <a:noFill/>
+        </p:spPr>
+        <p:txBody>
+          <a:bodyPr wrap="square" rtlCol="0">
+            <a:spAutoFit/>
+          </a:bodyPr>
+          <a:lstStyle/>
+          <a:p>
+            <a:pPr algn="ctr"/>
+            <a:r>
+              <a:rPr lang="en-US" sz="3600" dirty="0">
+                <a:solidFill>
+                  <a:schemeClr val="bg1">
+                    <a:lumMod val="95000"/>
+                  </a:schemeClr>
+                </a:solidFill>
+                <a:latin typeface="Times New Roman" panose="02020603050405020304" pitchFamily="18" charset="0"/>
+                <a:cs typeface="Times New Roman" panose="02020603050405020304" pitchFamily="18" charset="0"/>
+              </a:rPr>
+              <a:t>Self-CHOP</a:t>
+            </a:r>
+          </a:p>
+        </p:txBody>
+      </p:sp>
+      <p:sp>
+        <p:nvSpPr>
+          <p:cNvPr id="25" name="TextBox 24">
+            <a:extLst>
+              <a:ext uri="{FF2B5EF4-FFF2-40B4-BE49-F238E27FC236}">
+                <a16:creationId xmlns:a16="http://schemas.microsoft.com/office/drawing/2014/main" id="{BD701C71-EB35-84FC-4D0B-06F53FC135B6}"/>
+              </a:ext>
+            </a:extLst>
+          </p:cNvPr>
+          <p:cNvSpPr txBox="1"/>
+          <p:nvPr/>
+        </p:nvSpPr>
+        <p:spPr>
+          <a:xfrm>
+            <a:off x="4467840" y="21056244"/>
+            <a:ext cx="6248400" cy="646331"/>
+          </a:xfrm>
+          <a:prstGeom prst="rect">
+            <a:avLst/>
+          </a:prstGeom>
+          <a:noFill/>
+        </p:spPr>
+        <p:txBody>
+          <a:bodyPr wrap="square" rtlCol="0">
+            <a:spAutoFit/>
+          </a:bodyPr>
+          <a:lstStyle/>
+          <a:p>
+            <a:pPr algn="ctr"/>
+            <a:r>
+              <a:rPr lang="en-US" sz="3600" dirty="0">
+                <a:solidFill>
+                  <a:schemeClr val="bg1">
+                    <a:lumMod val="95000"/>
+                  </a:schemeClr>
+                </a:solidFill>
+                <a:latin typeface="Times New Roman" panose="02020603050405020304" pitchFamily="18" charset="0"/>
+                <a:cs typeface="Times New Roman" panose="02020603050405020304" pitchFamily="18" charset="0"/>
+              </a:rPr>
+              <a:t>Results</a:t>
+            </a:r>
+          </a:p>
+        </p:txBody>
+      </p:sp>
+      <p:sp>
+        <p:nvSpPr>
+          <p:cNvPr id="26" name="TextBox 25">
+            <a:extLst>
+              <a:ext uri="{FF2B5EF4-FFF2-40B4-BE49-F238E27FC236}">
+                <a16:creationId xmlns:a16="http://schemas.microsoft.com/office/drawing/2014/main" id="{420F3729-213D-583C-3D24-4F494730B982}"/>
+              </a:ext>
+            </a:extLst>
+          </p:cNvPr>
+          <p:cNvSpPr txBox="1"/>
+          <p:nvPr/>
+        </p:nvSpPr>
+        <p:spPr>
+          <a:xfrm>
+            <a:off x="18277080" y="21046554"/>
+            <a:ext cx="6248400" cy="646331"/>
+          </a:xfrm>
+          <a:prstGeom prst="rect">
+            <a:avLst/>
+          </a:prstGeom>
+          <a:noFill/>
+        </p:spPr>
+        <p:txBody>
+          <a:bodyPr wrap="square" rtlCol="0">
+            <a:spAutoFit/>
+          </a:bodyPr>
+          <a:lstStyle/>
+          <a:p>
+            <a:pPr algn="ctr"/>
+            <a:r>
+              <a:rPr lang="en-US" sz="3600" dirty="0">
+                <a:solidFill>
+                  <a:schemeClr val="bg1">
+                    <a:lumMod val="95000"/>
+                  </a:schemeClr>
+                </a:solidFill>
+                <a:latin typeface="Times New Roman" panose="02020603050405020304" pitchFamily="18" charset="0"/>
+                <a:cs typeface="Times New Roman" panose="02020603050405020304" pitchFamily="18" charset="0"/>
+              </a:rPr>
+              <a:t>Conclusions &amp; Future Work</a:t>
+            </a:r>
+          </a:p>
+        </p:txBody>
+      </p:sp>
+      <p:sp>
+        <p:nvSpPr>
+          <p:cNvPr id="27" name="TextBox 26">
+            <a:extLst>
+              <a:ext uri="{FF2B5EF4-FFF2-40B4-BE49-F238E27FC236}">
+                <a16:creationId xmlns:a16="http://schemas.microsoft.com/office/drawing/2014/main" id="{0D6A186A-B39E-4CA1-8647-5C2E5F28D30F}"/>
+              </a:ext>
+            </a:extLst>
+          </p:cNvPr>
+          <p:cNvSpPr txBox="1"/>
+          <p:nvPr/>
+        </p:nvSpPr>
+        <p:spPr>
+          <a:xfrm>
+            <a:off x="32087523" y="13386714"/>
+            <a:ext cx="6248400" cy="646331"/>
+          </a:xfrm>
+          <a:prstGeom prst="rect">
+            <a:avLst/>
+          </a:prstGeom>
+          <a:noFill/>
+        </p:spPr>
+        <p:txBody>
+          <a:bodyPr wrap="square" rtlCol="0">
+            <a:spAutoFit/>
+          </a:bodyPr>
+          <a:lstStyle/>
+          <a:p>
+            <a:pPr algn="ctr"/>
+            <a:r>
+              <a:rPr lang="en-US" sz="3600" dirty="0">
+                <a:solidFill>
+                  <a:schemeClr val="bg1">
+                    <a:lumMod val="95000"/>
+                  </a:schemeClr>
+                </a:solidFill>
+                <a:latin typeface="Times New Roman" panose="02020603050405020304" pitchFamily="18" charset="0"/>
+                <a:cs typeface="Times New Roman" panose="02020603050405020304" pitchFamily="18" charset="0"/>
+              </a:rPr>
+              <a:t>Conclusions</a:t>
+            </a:r>
+          </a:p>
+        </p:txBody>
+      </p:sp>
+      <p:sp>
+        <p:nvSpPr>
+          <p:cNvPr id="31" name="PlaceHolder 13">
+            <a:extLst>
+              <a:ext uri="{FF2B5EF4-FFF2-40B4-BE49-F238E27FC236}">
+                <a16:creationId xmlns:a16="http://schemas.microsoft.com/office/drawing/2014/main" id="{E53CCBC1-3D55-3748-9C5C-77DFAA2A1D27}"/>
+              </a:ext>
+            </a:extLst>
+          </p:cNvPr>
+          <p:cNvSpPr txBox="1">
+            <a:spLocks/>
+          </p:cNvSpPr>
+          <p:nvPr/>
+        </p:nvSpPr>
+        <p:spPr>
+          <a:xfrm>
+            <a:off x="29029680" y="13224960"/>
+            <a:ext cx="12273120" cy="1093680"/>
+          </a:xfrm>
+          <a:prstGeom prst="rect">
+            <a:avLst/>
+          </a:prstGeom>
+          <a:solidFill>
+            <a:srgbClr val="FF5757"/>
+          </a:solidFill>
+          <a:ln w="0">
+            <a:noFill/>
+          </a:ln>
+        </p:spPr>
+        <p:txBody>
+          <a:bodyPr lIns="365760" tIns="45000" rIns="90000" bIns="45000" anchor="ctr">
+            <a:noAutofit/>
+          </a:bodyPr>
+          <a:lstStyle>
+            <a:lvl1pPr marL="228600" indent="-228600" algn="l" defTabSz="914400" rtl="0" eaLnBrk="1" latinLnBrk="0" hangingPunct="1">
+              <a:lnSpc>
+                <a:spcPct val="90000"/>
+              </a:lnSpc>
+              <a:spcBef>
+                <a:spcPts val="1000"/>
+              </a:spcBef>
+              <a:buFont typeface="Arial" panose="020B0604020202020204" pitchFamily="34" charset="0"/>
+              <a:buChar char="•"/>
+              <a:defRPr sz="2800" kern="1200">
+                <a:solidFill>
+                  <a:schemeClr val="tx1"/>
+                </a:solidFill>
+                <a:latin typeface="+mn-lt"/>
+                <a:ea typeface="+mn-ea"/>
+                <a:cs typeface="+mn-cs"/>
+              </a:defRPr>
+            </a:lvl1pPr>
+            <a:lvl2pPr marL="685800" indent="-228600" algn="l" defTabSz="914400" rtl="0" eaLnBrk="1" latinLnBrk="0" hangingPunct="1">
+              <a:lnSpc>
+                <a:spcPct val="90000"/>
+              </a:lnSpc>
+              <a:spcBef>
+                <a:spcPts val="500"/>
+              </a:spcBef>
+              <a:buFont typeface="Arial" panose="020B0604020202020204" pitchFamily="34" charset="0"/>
+              <a:buChar char="•"/>
+              <a:defRPr sz="2400" kern="1200">
+                <a:solidFill>
+                  <a:schemeClr val="tx1"/>
+                </a:solidFill>
+                <a:latin typeface="+mn-lt"/>
+                <a:ea typeface="+mn-ea"/>
+                <a:cs typeface="+mn-cs"/>
+              </a:defRPr>
+            </a:lvl2pPr>
+            <a:lvl3pPr marL="1143000" indent="-228600" algn="l" defTabSz="914400" rtl="0" eaLnBrk="1" latinLnBrk="0" hangingPunct="1">
+              <a:lnSpc>
+                <a:spcPct val="90000"/>
+              </a:lnSpc>
+              <a:spcBef>
+                <a:spcPts val="500"/>
+              </a:spcBef>
+              <a:buFont typeface="Arial" panose="020B0604020202020204" pitchFamily="34" charset="0"/>
+              <a:buChar char="•"/>
+              <a:defRPr sz="2000" kern="1200">
+                <a:solidFill>
+                  <a:schemeClr val="tx1"/>
+                </a:solidFill>
+                <a:latin typeface="+mn-lt"/>
+                <a:ea typeface="+mn-ea"/>
+                <a:cs typeface="+mn-cs"/>
+              </a:defRPr>
+            </a:lvl3pPr>
+            <a:lvl4pPr marL="1600200" indent="-228600" algn="l" defTabSz="914400" rtl="0" eaLnBrk="1" latinLnBrk="0" hangingPunct="1">
+              <a:lnSpc>
+                <a:spcPct val="90000"/>
+              </a:lnSpc>
+              <a:spcBef>
+                <a:spcPts val="500"/>
+              </a:spcBef>
+              <a:buFont typeface="Arial" panose="020B0604020202020204" pitchFamily="34" charset="0"/>
+              <a:buChar char="•"/>
+              <a:defRPr sz="1800" kern="1200">
+                <a:solidFill>
+                  <a:schemeClr val="tx1"/>
+                </a:solidFill>
+                <a:latin typeface="+mn-lt"/>
+                <a:ea typeface="+mn-ea"/>
+                <a:cs typeface="+mn-cs"/>
+              </a:defRPr>
+            </a:lvl4pPr>
+            <a:lvl5pPr marL="2057400" indent="-228600" algn="l" defTabSz="914400" rtl="0" eaLnBrk="1" latinLnBrk="0" hangingPunct="1">
+              <a:lnSpc>
+                <a:spcPct val="90000"/>
+              </a:lnSpc>
+              <a:spcBef>
+                <a:spcPts val="500"/>
+              </a:spcBef>
+              <a:buFont typeface="Arial" panose="020B0604020202020204" pitchFamily="34" charset="0"/>
+              <a:buChar char="•"/>
+              <a:defRPr sz="1800" kern="1200">
+                <a:solidFill>
+                  <a:schemeClr val="tx1"/>
+                </a:solidFill>
+                <a:latin typeface="+mn-lt"/>
+                <a:ea typeface="+mn-ea"/>
+                <a:cs typeface="+mn-cs"/>
+              </a:defRPr>
+            </a:lvl5pPr>
+            <a:lvl6pPr marL="2514600" indent="-228600" algn="l" defTabSz="914400" rtl="0" eaLnBrk="1" latinLnBrk="0" hangingPunct="1">
+              <a:lnSpc>
+                <a:spcPct val="90000"/>
+              </a:lnSpc>
+              <a:spcBef>
+                <a:spcPts val="500"/>
+              </a:spcBef>
+              <a:buFont typeface="Arial" panose="020B0604020202020204" pitchFamily="34" charset="0"/>
+              <a:buChar char="•"/>
+              <a:defRPr sz="1800" kern="1200">
+                <a:solidFill>
+                  <a:schemeClr val="tx1"/>
+                </a:solidFill>
+                <a:latin typeface="+mn-lt"/>
+                <a:ea typeface="+mn-ea"/>
+                <a:cs typeface="+mn-cs"/>
+              </a:defRPr>
+            </a:lvl6pPr>
+            <a:lvl7pPr marL="2971800" indent="-228600" algn="l" defTabSz="914400" rtl="0" eaLnBrk="1" latinLnBrk="0" hangingPunct="1">
+              <a:lnSpc>
+                <a:spcPct val="90000"/>
+              </a:lnSpc>
+              <a:spcBef>
+                <a:spcPts val="500"/>
+              </a:spcBef>
+              <a:buFont typeface="Arial" panose="020B0604020202020204" pitchFamily="34" charset="0"/>
+              <a:buChar char="•"/>
+              <a:defRPr sz="1800" kern="1200">
+                <a:solidFill>
+                  <a:schemeClr val="tx1"/>
+                </a:solidFill>
+                <a:latin typeface="+mn-lt"/>
+                <a:ea typeface="+mn-ea"/>
+                <a:cs typeface="+mn-cs"/>
+              </a:defRPr>
+            </a:lvl7pPr>
+            <a:lvl8pPr marL="3429000" indent="-228600" algn="l" defTabSz="914400" rtl="0" eaLnBrk="1" latinLnBrk="0" hangingPunct="1">
+              <a:lnSpc>
+                <a:spcPct val="90000"/>
+              </a:lnSpc>
+              <a:spcBef>
+                <a:spcPts val="500"/>
+              </a:spcBef>
+              <a:buFont typeface="Arial" panose="020B0604020202020204" pitchFamily="34" charset="0"/>
+              <a:buChar char="•"/>
+              <a:defRPr sz="1800" kern="1200">
+                <a:solidFill>
+                  <a:schemeClr val="tx1"/>
+                </a:solidFill>
+                <a:latin typeface="+mn-lt"/>
+                <a:ea typeface="+mn-ea"/>
+                <a:cs typeface="+mn-cs"/>
+              </a:defRPr>
+            </a:lvl8pPr>
+            <a:lvl9pPr marL="3886200" indent="-228600" algn="l" defTabSz="914400" rtl="0" eaLnBrk="1" latinLnBrk="0" hangingPunct="1">
+              <a:lnSpc>
+                <a:spcPct val="90000"/>
+              </a:lnSpc>
+              <a:spcBef>
+                <a:spcPts val="500"/>
+              </a:spcBef>
+              <a:buFont typeface="Arial" panose="020B0604020202020204" pitchFamily="34" charset="0"/>
+              <a:buChar char="•"/>
+              <a:defRPr sz="1800" kern="1200">
+                <a:solidFill>
+                  <a:schemeClr val="tx1"/>
+                </a:solidFill>
+                <a:latin typeface="+mn-lt"/>
+                <a:ea typeface="+mn-ea"/>
+                <a:cs typeface="+mn-cs"/>
+              </a:defRPr>
+            </a:lvl9pPr>
+          </a:lstStyle>
+          <a:p>
+            <a:pPr indent="0">
+              <a:spcBef>
+                <a:spcPts val="1417"/>
+              </a:spcBef>
+              <a:buFont typeface="Arial" panose="020B0604020202020204" pitchFamily="34" charset="0"/>
+              <a:buNone/>
+            </a:pPr>
+            <a:endParaRPr lang="en-CA" sz="1800" spc="-1" dirty="0">
+              <a:solidFill>
+                <a:srgbClr val="000000"/>
+              </a:solidFill>
+              <a:latin typeface="Arial"/>
+            </a:endParaRPr>
+          </a:p>
+        </p:txBody>
+      </p:sp>
+      <p:sp>
+        <p:nvSpPr>
+          <p:cNvPr id="32" name="PlaceHolder 14">
+            <a:extLst>
+              <a:ext uri="{FF2B5EF4-FFF2-40B4-BE49-F238E27FC236}">
+                <a16:creationId xmlns:a16="http://schemas.microsoft.com/office/drawing/2014/main" id="{D735AC18-A77F-7740-5C5D-D6E6FC881983}"/>
+              </a:ext>
+            </a:extLst>
+          </p:cNvPr>
+          <p:cNvSpPr txBox="1">
+            <a:spLocks/>
+          </p:cNvSpPr>
+          <p:nvPr/>
+        </p:nvSpPr>
+        <p:spPr>
+          <a:xfrm>
+            <a:off x="29029680" y="14522040"/>
+            <a:ext cx="12273120" cy="6010200"/>
+          </a:xfrm>
+          <a:prstGeom prst="rect">
+            <a:avLst/>
+          </a:prstGeom>
+          <a:noFill/>
+          <a:ln w="0">
+            <a:noFill/>
+          </a:ln>
+        </p:spPr>
+        <p:txBody>
+          <a:bodyPr lIns="365760" tIns="182880" rIns="90000" bIns="45000" anchor="t">
+            <a:noAutofit/>
+          </a:bodyPr>
+          <a:lstStyle>
+            <a:lvl1pPr marL="228600" indent="-228600" algn="l" defTabSz="914400" rtl="0" eaLnBrk="1" latinLnBrk="0" hangingPunct="1">
+              <a:lnSpc>
+                <a:spcPct val="90000"/>
+              </a:lnSpc>
+              <a:spcBef>
+                <a:spcPts val="1000"/>
+              </a:spcBef>
+              <a:buFont typeface="Arial" panose="020B0604020202020204" pitchFamily="34" charset="0"/>
+              <a:buChar char="•"/>
+              <a:defRPr sz="2800" kern="1200">
+                <a:solidFill>
+                  <a:schemeClr val="tx1"/>
+                </a:solidFill>
+                <a:latin typeface="+mn-lt"/>
+                <a:ea typeface="+mn-ea"/>
+                <a:cs typeface="+mn-cs"/>
+              </a:defRPr>
+            </a:lvl1pPr>
+            <a:lvl2pPr marL="685800" indent="-228600" algn="l" defTabSz="914400" rtl="0" eaLnBrk="1" latinLnBrk="0" hangingPunct="1">
+              <a:lnSpc>
+                <a:spcPct val="90000"/>
+              </a:lnSpc>
+              <a:spcBef>
+                <a:spcPts val="500"/>
+              </a:spcBef>
+              <a:buFont typeface="Arial" panose="020B0604020202020204" pitchFamily="34" charset="0"/>
+              <a:buChar char="•"/>
+              <a:defRPr sz="2400" kern="1200">
+                <a:solidFill>
+                  <a:schemeClr val="tx1"/>
+                </a:solidFill>
+                <a:latin typeface="+mn-lt"/>
+                <a:ea typeface="+mn-ea"/>
+                <a:cs typeface="+mn-cs"/>
+              </a:defRPr>
+            </a:lvl2pPr>
+            <a:lvl3pPr marL="1143000" indent="-228600" algn="l" defTabSz="914400" rtl="0" eaLnBrk="1" latinLnBrk="0" hangingPunct="1">
+              <a:lnSpc>
+                <a:spcPct val="90000"/>
+              </a:lnSpc>
+              <a:spcBef>
+                <a:spcPts val="500"/>
+              </a:spcBef>
+              <a:buFont typeface="Arial" panose="020B0604020202020204" pitchFamily="34" charset="0"/>
+              <a:buChar char="•"/>
+              <a:defRPr sz="2000" kern="1200">
+                <a:solidFill>
+                  <a:schemeClr val="tx1"/>
+                </a:solidFill>
+                <a:latin typeface="+mn-lt"/>
+                <a:ea typeface="+mn-ea"/>
+                <a:cs typeface="+mn-cs"/>
+              </a:defRPr>
+            </a:lvl3pPr>
+            <a:lvl4pPr marL="1600200" indent="-228600" algn="l" defTabSz="914400" rtl="0" eaLnBrk="1" latinLnBrk="0" hangingPunct="1">
+              <a:lnSpc>
+                <a:spcPct val="90000"/>
+              </a:lnSpc>
+              <a:spcBef>
+                <a:spcPts val="500"/>
+              </a:spcBef>
+              <a:buFont typeface="Arial" panose="020B0604020202020204" pitchFamily="34" charset="0"/>
+              <a:buChar char="•"/>
+              <a:defRPr sz="1800" kern="1200">
+                <a:solidFill>
+                  <a:schemeClr val="tx1"/>
+                </a:solidFill>
+                <a:latin typeface="+mn-lt"/>
+                <a:ea typeface="+mn-ea"/>
+                <a:cs typeface="+mn-cs"/>
+              </a:defRPr>
+            </a:lvl4pPr>
+            <a:lvl5pPr marL="2057400" indent="-228600" algn="l" defTabSz="914400" rtl="0" eaLnBrk="1" latinLnBrk="0" hangingPunct="1">
+              <a:lnSpc>
+                <a:spcPct val="90000"/>
+              </a:lnSpc>
+              <a:spcBef>
+                <a:spcPts val="500"/>
+              </a:spcBef>
+              <a:buFont typeface="Arial" panose="020B0604020202020204" pitchFamily="34" charset="0"/>
+              <a:buChar char="•"/>
+              <a:defRPr sz="1800" kern="1200">
+                <a:solidFill>
+                  <a:schemeClr val="tx1"/>
+                </a:solidFill>
+                <a:latin typeface="+mn-lt"/>
+                <a:ea typeface="+mn-ea"/>
+                <a:cs typeface="+mn-cs"/>
+              </a:defRPr>
+            </a:lvl5pPr>
+            <a:lvl6pPr marL="2514600" indent="-228600" algn="l" defTabSz="914400" rtl="0" eaLnBrk="1" latinLnBrk="0" hangingPunct="1">
+              <a:lnSpc>
+                <a:spcPct val="90000"/>
+              </a:lnSpc>
+              <a:spcBef>
+                <a:spcPts val="500"/>
+              </a:spcBef>
+              <a:buFont typeface="Arial" panose="020B0604020202020204" pitchFamily="34" charset="0"/>
+              <a:buChar char="•"/>
+              <a:defRPr sz="1800" kern="1200">
+                <a:solidFill>
+                  <a:schemeClr val="tx1"/>
+                </a:solidFill>
+                <a:latin typeface="+mn-lt"/>
+                <a:ea typeface="+mn-ea"/>
+                <a:cs typeface="+mn-cs"/>
+              </a:defRPr>
+            </a:lvl6pPr>
+            <a:lvl7pPr marL="2971800" indent="-228600" algn="l" defTabSz="914400" rtl="0" eaLnBrk="1" latinLnBrk="0" hangingPunct="1">
+              <a:lnSpc>
+                <a:spcPct val="90000"/>
+              </a:lnSpc>
+              <a:spcBef>
+                <a:spcPts val="500"/>
+              </a:spcBef>
+              <a:buFont typeface="Arial" panose="020B0604020202020204" pitchFamily="34" charset="0"/>
+              <a:buChar char="•"/>
+              <a:defRPr sz="1800" kern="1200">
+                <a:solidFill>
+                  <a:schemeClr val="tx1"/>
+                </a:solidFill>
+                <a:latin typeface="+mn-lt"/>
+                <a:ea typeface="+mn-ea"/>
+                <a:cs typeface="+mn-cs"/>
+              </a:defRPr>
+            </a:lvl7pPr>
+            <a:lvl8pPr marL="3429000" indent="-228600" algn="l" defTabSz="914400" rtl="0" eaLnBrk="1" latinLnBrk="0" hangingPunct="1">
+              <a:lnSpc>
+                <a:spcPct val="90000"/>
+              </a:lnSpc>
+              <a:spcBef>
+                <a:spcPts val="500"/>
+              </a:spcBef>
+              <a:buFont typeface="Arial" panose="020B0604020202020204" pitchFamily="34" charset="0"/>
+              <a:buChar char="•"/>
+              <a:defRPr sz="1800" kern="1200">
+                <a:solidFill>
+                  <a:schemeClr val="tx1"/>
+                </a:solidFill>
+                <a:latin typeface="+mn-lt"/>
+                <a:ea typeface="+mn-ea"/>
+                <a:cs typeface="+mn-cs"/>
+              </a:defRPr>
+            </a:lvl8pPr>
+            <a:lvl9pPr marL="3886200" indent="-228600" algn="l" defTabSz="914400" rtl="0" eaLnBrk="1" latinLnBrk="0" hangingPunct="1">
+              <a:lnSpc>
+                <a:spcPct val="90000"/>
+              </a:lnSpc>
+              <a:spcBef>
+                <a:spcPts val="500"/>
+              </a:spcBef>
+              <a:buFont typeface="Arial" panose="020B0604020202020204" pitchFamily="34" charset="0"/>
+              <a:buChar char="•"/>
+              <a:defRPr sz="1800" kern="1200">
+                <a:solidFill>
+                  <a:schemeClr val="tx1"/>
+                </a:solidFill>
+                <a:latin typeface="+mn-lt"/>
+                <a:ea typeface="+mn-ea"/>
+                <a:cs typeface="+mn-cs"/>
+              </a:defRPr>
+            </a:lvl9pPr>
+          </a:lstStyle>
+          <a:p>
+            <a:pPr indent="0">
+              <a:spcBef>
+                <a:spcPts val="1417"/>
+              </a:spcBef>
+              <a:buFont typeface="Arial" panose="020B0604020202020204" pitchFamily="34" charset="0"/>
+              <a:buNone/>
+            </a:pPr>
+            <a:endParaRPr lang="en-CA" sz="1800" spc="-1">
+              <a:solidFill>
+                <a:srgbClr val="000000"/>
+              </a:solidFill>
+              <a:latin typeface="Arial"/>
+            </a:endParaRPr>
+          </a:p>
+        </p:txBody>
+      </p:sp>
+      <p:sp>
+        <p:nvSpPr>
+          <p:cNvPr id="33" name="Rectangle 32">
+            <a:extLst>
+              <a:ext uri="{FF2B5EF4-FFF2-40B4-BE49-F238E27FC236}">
+                <a16:creationId xmlns:a16="http://schemas.microsoft.com/office/drawing/2014/main" id="{1EFD793B-301B-9042-CC17-CA2F3F589E97}"/>
               </a:ext>
             </a:extLst>
           </p:cNvPr>
@@ -5003,8 +5426,8 @@
         </p:nvSpPr>
         <p:spPr>
           <a:xfrm>
-            <a:off x="1455480" y="20919210"/>
-            <a:ext cx="12273120" cy="920400"/>
+            <a:off x="29029680" y="13224960"/>
+            <a:ext cx="12273120" cy="919800"/>
           </a:xfrm>
           <a:prstGeom prst="rect">
             <a:avLst/>
@@ -5050,10 +5473,480 @@
       </p:sp>
       <p:sp>
         <p:nvSpPr>
-          <p:cNvPr id="16" name="Rectangle 15">
+          <p:cNvPr id="34" name="TextBox 33">
             <a:extLst>
               <a:ext uri="{FF2B5EF4-FFF2-40B4-BE49-F238E27FC236}">
-                <a16:creationId xmlns:a16="http://schemas.microsoft.com/office/drawing/2014/main" id="{32E39BE6-CD54-2E37-9DF3-B1D89E0C9D98}"/>
+                <a16:creationId xmlns:a16="http://schemas.microsoft.com/office/drawing/2014/main" id="{790B5FED-B81D-D182-0DC5-8A2D2284BAB4}"/>
+              </a:ext>
+            </a:extLst>
+          </p:cNvPr>
+          <p:cNvSpPr txBox="1"/>
+          <p:nvPr/>
+        </p:nvSpPr>
+        <p:spPr>
+          <a:xfrm>
+            <a:off x="32042040" y="13363904"/>
+            <a:ext cx="6248400" cy="646331"/>
+          </a:xfrm>
+          <a:prstGeom prst="rect">
+            <a:avLst/>
+          </a:prstGeom>
+          <a:noFill/>
+        </p:spPr>
+        <p:txBody>
+          <a:bodyPr wrap="square" rtlCol="0">
+            <a:spAutoFit/>
+          </a:bodyPr>
+          <a:lstStyle/>
+          <a:p>
+            <a:pPr algn="ctr"/>
+            <a:r>
+              <a:rPr lang="en-US" sz="3600" dirty="0">
+                <a:solidFill>
+                  <a:schemeClr val="bg1">
+                    <a:lumMod val="95000"/>
+                  </a:schemeClr>
+                </a:solidFill>
+                <a:latin typeface="Times New Roman" panose="02020603050405020304" pitchFamily="18" charset="0"/>
+                <a:cs typeface="Times New Roman" panose="02020603050405020304" pitchFamily="18" charset="0"/>
+              </a:rPr>
+              <a:t>Approach</a:t>
+            </a:r>
+          </a:p>
+        </p:txBody>
+      </p:sp>
+      <p:sp>
+        <p:nvSpPr>
+          <p:cNvPr id="35" name="PlaceHolder 15">
+            <a:extLst>
+              <a:ext uri="{FF2B5EF4-FFF2-40B4-BE49-F238E27FC236}">
+                <a16:creationId xmlns:a16="http://schemas.microsoft.com/office/drawing/2014/main" id="{7A7D0355-B999-4B05-0DB0-E4D7EA8503B3}"/>
+              </a:ext>
+            </a:extLst>
+          </p:cNvPr>
+          <p:cNvSpPr txBox="1">
+            <a:spLocks/>
+          </p:cNvSpPr>
+          <p:nvPr/>
+        </p:nvSpPr>
+        <p:spPr>
+          <a:xfrm>
+            <a:off x="29029680" y="20919210"/>
+            <a:ext cx="12273120" cy="1093680"/>
+          </a:xfrm>
+          <a:prstGeom prst="rect">
+            <a:avLst/>
+          </a:prstGeom>
+          <a:solidFill>
+            <a:srgbClr val="FF5757"/>
+          </a:solidFill>
+          <a:ln w="0">
+            <a:noFill/>
+          </a:ln>
+        </p:spPr>
+        <p:txBody>
+          <a:bodyPr lIns="365760" tIns="45000" rIns="90000" bIns="45000" anchor="ctr">
+            <a:noAutofit/>
+          </a:bodyPr>
+          <a:lstStyle>
+            <a:lvl1pPr marL="228600" indent="-228600" algn="l" defTabSz="914400" rtl="0" eaLnBrk="1" latinLnBrk="0" hangingPunct="1">
+              <a:lnSpc>
+                <a:spcPct val="90000"/>
+              </a:lnSpc>
+              <a:spcBef>
+                <a:spcPts val="1000"/>
+              </a:spcBef>
+              <a:buFont typeface="Arial" panose="020B0604020202020204" pitchFamily="34" charset="0"/>
+              <a:buChar char="•"/>
+              <a:defRPr sz="2800" kern="1200">
+                <a:solidFill>
+                  <a:schemeClr val="tx1"/>
+                </a:solidFill>
+                <a:latin typeface="+mn-lt"/>
+                <a:ea typeface="+mn-ea"/>
+                <a:cs typeface="+mn-cs"/>
+              </a:defRPr>
+            </a:lvl1pPr>
+            <a:lvl2pPr marL="685800" indent="-228600" algn="l" defTabSz="914400" rtl="0" eaLnBrk="1" latinLnBrk="0" hangingPunct="1">
+              <a:lnSpc>
+                <a:spcPct val="90000"/>
+              </a:lnSpc>
+              <a:spcBef>
+                <a:spcPts val="500"/>
+              </a:spcBef>
+              <a:buFont typeface="Arial" panose="020B0604020202020204" pitchFamily="34" charset="0"/>
+              <a:buChar char="•"/>
+              <a:defRPr sz="2400" kern="1200">
+                <a:solidFill>
+                  <a:schemeClr val="tx1"/>
+                </a:solidFill>
+                <a:latin typeface="+mn-lt"/>
+                <a:ea typeface="+mn-ea"/>
+                <a:cs typeface="+mn-cs"/>
+              </a:defRPr>
+            </a:lvl2pPr>
+            <a:lvl3pPr marL="1143000" indent="-228600" algn="l" defTabSz="914400" rtl="0" eaLnBrk="1" latinLnBrk="0" hangingPunct="1">
+              <a:lnSpc>
+                <a:spcPct val="90000"/>
+              </a:lnSpc>
+              <a:spcBef>
+                <a:spcPts val="500"/>
+              </a:spcBef>
+              <a:buFont typeface="Arial" panose="020B0604020202020204" pitchFamily="34" charset="0"/>
+              <a:buChar char="•"/>
+              <a:defRPr sz="2000" kern="1200">
+                <a:solidFill>
+                  <a:schemeClr val="tx1"/>
+                </a:solidFill>
+                <a:latin typeface="+mn-lt"/>
+                <a:ea typeface="+mn-ea"/>
+                <a:cs typeface="+mn-cs"/>
+              </a:defRPr>
+            </a:lvl3pPr>
+            <a:lvl4pPr marL="1600200" indent="-228600" algn="l" defTabSz="914400" rtl="0" eaLnBrk="1" latinLnBrk="0" hangingPunct="1">
+              <a:lnSpc>
+                <a:spcPct val="90000"/>
+              </a:lnSpc>
+              <a:spcBef>
+                <a:spcPts val="500"/>
+              </a:spcBef>
+              <a:buFont typeface="Arial" panose="020B0604020202020204" pitchFamily="34" charset="0"/>
+              <a:buChar char="•"/>
+              <a:defRPr sz="1800" kern="1200">
+                <a:solidFill>
+                  <a:schemeClr val="tx1"/>
+                </a:solidFill>
+                <a:latin typeface="+mn-lt"/>
+                <a:ea typeface="+mn-ea"/>
+                <a:cs typeface="+mn-cs"/>
+              </a:defRPr>
+            </a:lvl4pPr>
+            <a:lvl5pPr marL="2057400" indent="-228600" algn="l" defTabSz="914400" rtl="0" eaLnBrk="1" latinLnBrk="0" hangingPunct="1">
+              <a:lnSpc>
+                <a:spcPct val="90000"/>
+              </a:lnSpc>
+              <a:spcBef>
+                <a:spcPts val="500"/>
+              </a:spcBef>
+              <a:buFont typeface="Arial" panose="020B0604020202020204" pitchFamily="34" charset="0"/>
+              <a:buChar char="•"/>
+              <a:defRPr sz="1800" kern="1200">
+                <a:solidFill>
+                  <a:schemeClr val="tx1"/>
+                </a:solidFill>
+                <a:latin typeface="+mn-lt"/>
+                <a:ea typeface="+mn-ea"/>
+                <a:cs typeface="+mn-cs"/>
+              </a:defRPr>
+            </a:lvl5pPr>
+            <a:lvl6pPr marL="2514600" indent="-228600" algn="l" defTabSz="914400" rtl="0" eaLnBrk="1" latinLnBrk="0" hangingPunct="1">
+              <a:lnSpc>
+                <a:spcPct val="90000"/>
+              </a:lnSpc>
+              <a:spcBef>
+                <a:spcPts val="500"/>
+              </a:spcBef>
+              <a:buFont typeface="Arial" panose="020B0604020202020204" pitchFamily="34" charset="0"/>
+              <a:buChar char="•"/>
+              <a:defRPr sz="1800" kern="1200">
+                <a:solidFill>
+                  <a:schemeClr val="tx1"/>
+                </a:solidFill>
+                <a:latin typeface="+mn-lt"/>
+                <a:ea typeface="+mn-ea"/>
+                <a:cs typeface="+mn-cs"/>
+              </a:defRPr>
+            </a:lvl6pPr>
+            <a:lvl7pPr marL="2971800" indent="-228600" algn="l" defTabSz="914400" rtl="0" eaLnBrk="1" latinLnBrk="0" hangingPunct="1">
+              <a:lnSpc>
+                <a:spcPct val="90000"/>
+              </a:lnSpc>
+              <a:spcBef>
+                <a:spcPts val="500"/>
+              </a:spcBef>
+              <a:buFont typeface="Arial" panose="020B0604020202020204" pitchFamily="34" charset="0"/>
+              <a:buChar char="•"/>
+              <a:defRPr sz="1800" kern="1200">
+                <a:solidFill>
+                  <a:schemeClr val="tx1"/>
+                </a:solidFill>
+                <a:latin typeface="+mn-lt"/>
+                <a:ea typeface="+mn-ea"/>
+                <a:cs typeface="+mn-cs"/>
+              </a:defRPr>
+            </a:lvl7pPr>
+            <a:lvl8pPr marL="3429000" indent="-228600" algn="l" defTabSz="914400" rtl="0" eaLnBrk="1" latinLnBrk="0" hangingPunct="1">
+              <a:lnSpc>
+                <a:spcPct val="90000"/>
+              </a:lnSpc>
+              <a:spcBef>
+                <a:spcPts val="500"/>
+              </a:spcBef>
+              <a:buFont typeface="Arial" panose="020B0604020202020204" pitchFamily="34" charset="0"/>
+              <a:buChar char="•"/>
+              <a:defRPr sz="1800" kern="1200">
+                <a:solidFill>
+                  <a:schemeClr val="tx1"/>
+                </a:solidFill>
+                <a:latin typeface="+mn-lt"/>
+                <a:ea typeface="+mn-ea"/>
+                <a:cs typeface="+mn-cs"/>
+              </a:defRPr>
+            </a:lvl8pPr>
+            <a:lvl9pPr marL="3886200" indent="-228600" algn="l" defTabSz="914400" rtl="0" eaLnBrk="1" latinLnBrk="0" hangingPunct="1">
+              <a:lnSpc>
+                <a:spcPct val="90000"/>
+              </a:lnSpc>
+              <a:spcBef>
+                <a:spcPts val="500"/>
+              </a:spcBef>
+              <a:buFont typeface="Arial" panose="020B0604020202020204" pitchFamily="34" charset="0"/>
+              <a:buChar char="•"/>
+              <a:defRPr sz="1800" kern="1200">
+                <a:solidFill>
+                  <a:schemeClr val="tx1"/>
+                </a:solidFill>
+                <a:latin typeface="+mn-lt"/>
+                <a:ea typeface="+mn-ea"/>
+                <a:cs typeface="+mn-cs"/>
+              </a:defRPr>
+            </a:lvl9pPr>
+          </a:lstStyle>
+          <a:p>
+            <a:pPr indent="0">
+              <a:spcBef>
+                <a:spcPts val="1417"/>
+              </a:spcBef>
+              <a:buFont typeface="Arial" panose="020B0604020202020204" pitchFamily="34" charset="0"/>
+              <a:buNone/>
+            </a:pPr>
+            <a:endParaRPr lang="en-CA" sz="1800" spc="-1" dirty="0">
+              <a:solidFill>
+                <a:srgbClr val="000000"/>
+              </a:solidFill>
+              <a:latin typeface="Arial"/>
+            </a:endParaRPr>
+          </a:p>
+        </p:txBody>
+      </p:sp>
+      <p:sp>
+        <p:nvSpPr>
+          <p:cNvPr id="36" name="PlaceHolder 16">
+            <a:extLst>
+              <a:ext uri="{FF2B5EF4-FFF2-40B4-BE49-F238E27FC236}">
+                <a16:creationId xmlns:a16="http://schemas.microsoft.com/office/drawing/2014/main" id="{D8421799-EB40-BC42-3376-8C3AE449657A}"/>
+              </a:ext>
+            </a:extLst>
+          </p:cNvPr>
+          <p:cNvSpPr txBox="1">
+            <a:spLocks/>
+          </p:cNvSpPr>
+          <p:nvPr/>
+        </p:nvSpPr>
+        <p:spPr>
+          <a:xfrm>
+            <a:off x="29029680" y="22216290"/>
+            <a:ext cx="12273120" cy="6550560"/>
+          </a:xfrm>
+          <a:prstGeom prst="rect">
+            <a:avLst/>
+          </a:prstGeom>
+          <a:noFill/>
+          <a:ln w="0">
+            <a:noFill/>
+          </a:ln>
+        </p:spPr>
+        <p:txBody>
+          <a:bodyPr lIns="365760" tIns="182880" rIns="90000" bIns="45000" anchor="t">
+            <a:noAutofit/>
+          </a:bodyPr>
+          <a:lstStyle>
+            <a:lvl1pPr marL="228600" indent="-228600" algn="l" defTabSz="914400" rtl="0" eaLnBrk="1" latinLnBrk="0" hangingPunct="1">
+              <a:lnSpc>
+                <a:spcPct val="90000"/>
+              </a:lnSpc>
+              <a:spcBef>
+                <a:spcPts val="1000"/>
+              </a:spcBef>
+              <a:buFont typeface="Arial" panose="020B0604020202020204" pitchFamily="34" charset="0"/>
+              <a:buChar char="•"/>
+              <a:defRPr sz="2800" kern="1200">
+                <a:solidFill>
+                  <a:schemeClr val="tx1"/>
+                </a:solidFill>
+                <a:latin typeface="+mn-lt"/>
+                <a:ea typeface="+mn-ea"/>
+                <a:cs typeface="+mn-cs"/>
+              </a:defRPr>
+            </a:lvl1pPr>
+            <a:lvl2pPr marL="685800" indent="-228600" algn="l" defTabSz="914400" rtl="0" eaLnBrk="1" latinLnBrk="0" hangingPunct="1">
+              <a:lnSpc>
+                <a:spcPct val="90000"/>
+              </a:lnSpc>
+              <a:spcBef>
+                <a:spcPts val="500"/>
+              </a:spcBef>
+              <a:buFont typeface="Arial" panose="020B0604020202020204" pitchFamily="34" charset="0"/>
+              <a:buChar char="•"/>
+              <a:defRPr sz="2400" kern="1200">
+                <a:solidFill>
+                  <a:schemeClr val="tx1"/>
+                </a:solidFill>
+                <a:latin typeface="+mn-lt"/>
+                <a:ea typeface="+mn-ea"/>
+                <a:cs typeface="+mn-cs"/>
+              </a:defRPr>
+            </a:lvl2pPr>
+            <a:lvl3pPr marL="1143000" indent="-228600" algn="l" defTabSz="914400" rtl="0" eaLnBrk="1" latinLnBrk="0" hangingPunct="1">
+              <a:lnSpc>
+                <a:spcPct val="90000"/>
+              </a:lnSpc>
+              <a:spcBef>
+                <a:spcPts val="500"/>
+              </a:spcBef>
+              <a:buFont typeface="Arial" panose="020B0604020202020204" pitchFamily="34" charset="0"/>
+              <a:buChar char="•"/>
+              <a:defRPr sz="2000" kern="1200">
+                <a:solidFill>
+                  <a:schemeClr val="tx1"/>
+                </a:solidFill>
+                <a:latin typeface="+mn-lt"/>
+                <a:ea typeface="+mn-ea"/>
+                <a:cs typeface="+mn-cs"/>
+              </a:defRPr>
+            </a:lvl3pPr>
+            <a:lvl4pPr marL="1600200" indent="-228600" algn="l" defTabSz="914400" rtl="0" eaLnBrk="1" latinLnBrk="0" hangingPunct="1">
+              <a:lnSpc>
+                <a:spcPct val="90000"/>
+              </a:lnSpc>
+              <a:spcBef>
+                <a:spcPts val="500"/>
+              </a:spcBef>
+              <a:buFont typeface="Arial" panose="020B0604020202020204" pitchFamily="34" charset="0"/>
+              <a:buChar char="•"/>
+              <a:defRPr sz="1800" kern="1200">
+                <a:solidFill>
+                  <a:schemeClr val="tx1"/>
+                </a:solidFill>
+                <a:latin typeface="+mn-lt"/>
+                <a:ea typeface="+mn-ea"/>
+                <a:cs typeface="+mn-cs"/>
+              </a:defRPr>
+            </a:lvl4pPr>
+            <a:lvl5pPr marL="2057400" indent="-228600" algn="l" defTabSz="914400" rtl="0" eaLnBrk="1" latinLnBrk="0" hangingPunct="1">
+              <a:lnSpc>
+                <a:spcPct val="90000"/>
+              </a:lnSpc>
+              <a:spcBef>
+                <a:spcPts val="500"/>
+              </a:spcBef>
+              <a:buFont typeface="Arial" panose="020B0604020202020204" pitchFamily="34" charset="0"/>
+              <a:buChar char="•"/>
+              <a:defRPr sz="1800" kern="1200">
+                <a:solidFill>
+                  <a:schemeClr val="tx1"/>
+                </a:solidFill>
+                <a:latin typeface="+mn-lt"/>
+                <a:ea typeface="+mn-ea"/>
+                <a:cs typeface="+mn-cs"/>
+              </a:defRPr>
+            </a:lvl5pPr>
+            <a:lvl6pPr marL="2514600" indent="-228600" algn="l" defTabSz="914400" rtl="0" eaLnBrk="1" latinLnBrk="0" hangingPunct="1">
+              <a:lnSpc>
+                <a:spcPct val="90000"/>
+              </a:lnSpc>
+              <a:spcBef>
+                <a:spcPts val="500"/>
+              </a:spcBef>
+              <a:buFont typeface="Arial" panose="020B0604020202020204" pitchFamily="34" charset="0"/>
+              <a:buChar char="•"/>
+              <a:defRPr sz="1800" kern="1200">
+                <a:solidFill>
+                  <a:schemeClr val="tx1"/>
+                </a:solidFill>
+                <a:latin typeface="+mn-lt"/>
+                <a:ea typeface="+mn-ea"/>
+                <a:cs typeface="+mn-cs"/>
+              </a:defRPr>
+            </a:lvl6pPr>
+            <a:lvl7pPr marL="2971800" indent="-228600" algn="l" defTabSz="914400" rtl="0" eaLnBrk="1" latinLnBrk="0" hangingPunct="1">
+              <a:lnSpc>
+                <a:spcPct val="90000"/>
+              </a:lnSpc>
+              <a:spcBef>
+                <a:spcPts val="500"/>
+              </a:spcBef>
+              <a:buFont typeface="Arial" panose="020B0604020202020204" pitchFamily="34" charset="0"/>
+              <a:buChar char="•"/>
+              <a:defRPr sz="1800" kern="1200">
+                <a:solidFill>
+                  <a:schemeClr val="tx1"/>
+                </a:solidFill>
+                <a:latin typeface="+mn-lt"/>
+                <a:ea typeface="+mn-ea"/>
+                <a:cs typeface="+mn-cs"/>
+              </a:defRPr>
+            </a:lvl7pPr>
+            <a:lvl8pPr marL="3429000" indent="-228600" algn="l" defTabSz="914400" rtl="0" eaLnBrk="1" latinLnBrk="0" hangingPunct="1">
+              <a:lnSpc>
+                <a:spcPct val="90000"/>
+              </a:lnSpc>
+              <a:spcBef>
+                <a:spcPts val="500"/>
+              </a:spcBef>
+              <a:buFont typeface="Arial" panose="020B0604020202020204" pitchFamily="34" charset="0"/>
+              <a:buChar char="•"/>
+              <a:defRPr sz="1800" kern="1200">
+                <a:solidFill>
+                  <a:schemeClr val="tx1"/>
+                </a:solidFill>
+                <a:latin typeface="+mn-lt"/>
+                <a:ea typeface="+mn-ea"/>
+                <a:cs typeface="+mn-cs"/>
+              </a:defRPr>
+            </a:lvl8pPr>
+            <a:lvl9pPr marL="3886200" indent="-228600" algn="l" defTabSz="914400" rtl="0" eaLnBrk="1" latinLnBrk="0" hangingPunct="1">
+              <a:lnSpc>
+                <a:spcPct val="90000"/>
+              </a:lnSpc>
+              <a:spcBef>
+                <a:spcPts val="500"/>
+              </a:spcBef>
+              <a:buFont typeface="Arial" panose="020B0604020202020204" pitchFamily="34" charset="0"/>
+              <a:buChar char="•"/>
+              <a:defRPr sz="1800" kern="1200">
+                <a:solidFill>
+                  <a:schemeClr val="tx1"/>
+                </a:solidFill>
+                <a:latin typeface="+mn-lt"/>
+                <a:ea typeface="+mn-ea"/>
+                <a:cs typeface="+mn-cs"/>
+              </a:defRPr>
+            </a:lvl9pPr>
+          </a:lstStyle>
+          <a:p>
+            <a:pPr indent="0">
+              <a:spcBef>
+                <a:spcPts val="1417"/>
+              </a:spcBef>
+              <a:buFont typeface="Arial" panose="020B0604020202020204" pitchFamily="34" charset="0"/>
+              <a:buNone/>
+            </a:pPr>
+            <a:endParaRPr lang="en-CA" sz="1800" spc="-1" dirty="0">
+              <a:solidFill>
+                <a:srgbClr val="000000"/>
+              </a:solidFill>
+              <a:latin typeface="Arial"/>
+            </a:endParaRPr>
+          </a:p>
+        </p:txBody>
+      </p:sp>
+      <p:sp>
+        <p:nvSpPr>
+          <p:cNvPr id="37" name="Rectangle 36">
+            <a:extLst>
+              <a:ext uri="{FF2B5EF4-FFF2-40B4-BE49-F238E27FC236}">
+                <a16:creationId xmlns:a16="http://schemas.microsoft.com/office/drawing/2014/main" id="{CF2FE002-A11A-D235-8FB0-1B4326535C98}"/>
               </a:ext>
             </a:extLst>
           </p:cNvPr>
@@ -5062,7 +5955,7 @@
         </p:nvSpPr>
         <p:spPr>
           <a:xfrm>
-            <a:off x="15264720" y="20909520"/>
+            <a:off x="29029680" y="20919210"/>
             <a:ext cx="12273120" cy="920400"/>
           </a:xfrm>
           <a:prstGeom prst="rect">
@@ -5109,128 +6002,10 @@
       </p:sp>
       <p:sp>
         <p:nvSpPr>
-          <p:cNvPr id="17" name="Rectangle 16">
+          <p:cNvPr id="38" name="TextBox 37">
             <a:extLst>
               <a:ext uri="{FF2B5EF4-FFF2-40B4-BE49-F238E27FC236}">
-                <a16:creationId xmlns:a16="http://schemas.microsoft.com/office/drawing/2014/main" id="{93EC21D5-5A6D-E63D-7B1F-48831411B394}"/>
-              </a:ext>
-            </a:extLst>
-          </p:cNvPr>
-          <p:cNvSpPr/>
-          <p:nvPr/>
-        </p:nvSpPr>
-        <p:spPr>
-          <a:xfrm>
-            <a:off x="29029680" y="18108360"/>
-            <a:ext cx="12273120" cy="920400"/>
-          </a:xfrm>
-          <a:prstGeom prst="rect">
-            <a:avLst/>
-          </a:prstGeom>
-          <a:solidFill>
-            <a:srgbClr val="595959"/>
-          </a:solidFill>
-          <a:ln>
-            <a:noFill/>
-          </a:ln>
-        </p:spPr>
-        <p:style>
-          <a:lnRef idx="2">
-            <a:schemeClr val="accent1">
-              <a:shade val="15000"/>
-            </a:schemeClr>
-          </a:lnRef>
-          <a:fillRef idx="1">
-            <a:schemeClr val="accent1"/>
-          </a:fillRef>
-          <a:effectRef idx="0">
-            <a:schemeClr val="accent1"/>
-          </a:effectRef>
-          <a:fontRef idx="minor">
-            <a:schemeClr val="lt1"/>
-          </a:fontRef>
-        </p:style>
-        <p:txBody>
-          <a:bodyPr rtlCol="0" anchor="ctr"/>
-          <a:lstStyle/>
-          <a:p>
-            <a:pPr algn="ctr"/>
-            <a:endParaRPr lang="en-US">
-              <a:solidFill>
-                <a:schemeClr val="tx2">
-                  <a:lumMod val="25000"/>
-                  <a:lumOff val="75000"/>
-                </a:schemeClr>
-              </a:solidFill>
-            </a:endParaRPr>
-          </a:p>
-        </p:txBody>
-      </p:sp>
-      <p:sp>
-        <p:nvSpPr>
-          <p:cNvPr id="18" name="Rectangle 17">
-            <a:extLst>
-              <a:ext uri="{FF2B5EF4-FFF2-40B4-BE49-F238E27FC236}">
-                <a16:creationId xmlns:a16="http://schemas.microsoft.com/office/drawing/2014/main" id="{85506F2C-D035-6B4A-42F1-DD3096413198}"/>
-              </a:ext>
-            </a:extLst>
-          </p:cNvPr>
-          <p:cNvSpPr/>
-          <p:nvPr/>
-        </p:nvSpPr>
-        <p:spPr>
-          <a:xfrm>
-            <a:off x="29029680" y="23454720"/>
-            <a:ext cx="12273120" cy="920400"/>
-          </a:xfrm>
-          <a:prstGeom prst="rect">
-            <a:avLst/>
-          </a:prstGeom>
-          <a:solidFill>
-            <a:srgbClr val="595959"/>
-          </a:solidFill>
-          <a:ln>
-            <a:noFill/>
-          </a:ln>
-        </p:spPr>
-        <p:style>
-          <a:lnRef idx="2">
-            <a:schemeClr val="accent1">
-              <a:shade val="15000"/>
-            </a:schemeClr>
-          </a:lnRef>
-          <a:fillRef idx="1">
-            <a:schemeClr val="accent1"/>
-          </a:fillRef>
-          <a:effectRef idx="0">
-            <a:schemeClr val="accent1"/>
-          </a:effectRef>
-          <a:fontRef idx="minor">
-            <a:schemeClr val="lt1"/>
-          </a:fontRef>
-        </p:style>
-        <p:txBody>
-          <a:bodyPr rtlCol="0" anchor="ctr"/>
-          <a:lstStyle/>
-          <a:p>
-            <a:pPr algn="ctr"/>
-            <a:endParaRPr lang="en-US">
-              <a:solidFill>
-                <a:schemeClr val="tx2">
-                  <a:lumMod val="25000"/>
-                  <a:lumOff val="75000"/>
-                </a:schemeClr>
-              </a:solidFill>
-            </a:endParaRPr>
-          </a:p>
-        </p:txBody>
-      </p:sp>
-      <p:sp>
-        <p:nvSpPr>
-          <p:cNvPr id="19" name="TextBox 18">
-            <a:extLst>
-              <a:ext uri="{FF2B5EF4-FFF2-40B4-BE49-F238E27FC236}">
-                <a16:creationId xmlns:a16="http://schemas.microsoft.com/office/drawing/2014/main" id="{6689A257-2B7B-AB39-AEB7-8F3B74D28E4E}"/>
+                <a16:creationId xmlns:a16="http://schemas.microsoft.com/office/drawing/2014/main" id="{194AED81-E7C0-DD7A-69BA-8086CFEF7769}"/>
               </a:ext>
             </a:extLst>
           </p:cNvPr>
@@ -5239,7 +6014,7 @@
         </p:nvSpPr>
         <p:spPr>
           <a:xfrm>
-            <a:off x="4467840" y="5620828"/>
+            <a:off x="32042040" y="21056244"/>
             <a:ext cx="6248400" cy="646331"/>
           </a:xfrm>
           <a:prstGeom prst="rect">
@@ -5264,447 +6039,7 @@
                 <a:latin typeface="Times New Roman" panose="02020603050405020304" pitchFamily="18" charset="0"/>
                 <a:cs typeface="Times New Roman" panose="02020603050405020304" pitchFamily="18" charset="0"/>
               </a:rPr>
-              <a:t>Problem Description</a:t>
-            </a:r>
-          </a:p>
-        </p:txBody>
-      </p:sp>
-      <p:sp>
-        <p:nvSpPr>
-          <p:cNvPr id="20" name="TextBox 19">
-            <a:extLst>
-              <a:ext uri="{FF2B5EF4-FFF2-40B4-BE49-F238E27FC236}">
-                <a16:creationId xmlns:a16="http://schemas.microsoft.com/office/drawing/2014/main" id="{8D4AAACB-9920-6117-78E2-E14CA7AAF371}"/>
-              </a:ext>
-            </a:extLst>
-          </p:cNvPr>
-          <p:cNvSpPr txBox="1"/>
-          <p:nvPr/>
-        </p:nvSpPr>
-        <p:spPr>
-          <a:xfrm>
-            <a:off x="18277080" y="5596045"/>
-            <a:ext cx="6248400" cy="646331"/>
-          </a:xfrm>
-          <a:prstGeom prst="rect">
-            <a:avLst/>
-          </a:prstGeom>
-          <a:noFill/>
-        </p:spPr>
-        <p:txBody>
-          <a:bodyPr wrap="square" rtlCol="0">
-            <a:spAutoFit/>
-          </a:bodyPr>
-          <a:lstStyle/>
-          <a:p>
-            <a:pPr algn="ctr"/>
-            <a:r>
-              <a:rPr lang="en-US" sz="3600" dirty="0">
-                <a:solidFill>
-                  <a:schemeClr val="bg1">
-                    <a:lumMod val="95000"/>
-                  </a:schemeClr>
-                </a:solidFill>
-                <a:latin typeface="Times New Roman" panose="02020603050405020304" pitchFamily="18" charset="0"/>
-                <a:cs typeface="Times New Roman" panose="02020603050405020304" pitchFamily="18" charset="0"/>
-              </a:rPr>
-              <a:t>Problem Description</a:t>
-            </a:r>
-          </a:p>
-        </p:txBody>
-      </p:sp>
-      <p:sp>
-        <p:nvSpPr>
-          <p:cNvPr id="21" name="TextBox 20">
-            <a:extLst>
-              <a:ext uri="{FF2B5EF4-FFF2-40B4-BE49-F238E27FC236}">
-                <a16:creationId xmlns:a16="http://schemas.microsoft.com/office/drawing/2014/main" id="{C67DB4E6-8DBE-4980-053B-04CD4970F407}"/>
-              </a:ext>
-            </a:extLst>
-          </p:cNvPr>
-          <p:cNvSpPr txBox="1"/>
-          <p:nvPr/>
-        </p:nvSpPr>
-        <p:spPr>
-          <a:xfrm>
-            <a:off x="4467840" y="9953934"/>
-            <a:ext cx="6248400" cy="646331"/>
-          </a:xfrm>
-          <a:prstGeom prst="rect">
-            <a:avLst/>
-          </a:prstGeom>
-          <a:noFill/>
-        </p:spPr>
-        <p:txBody>
-          <a:bodyPr wrap="square" rtlCol="0">
-            <a:spAutoFit/>
-          </a:bodyPr>
-          <a:lstStyle/>
-          <a:p>
-            <a:pPr algn="ctr"/>
-            <a:r>
-              <a:rPr lang="en-US" sz="3600" dirty="0">
-                <a:solidFill>
-                  <a:schemeClr val="bg1">
-                    <a:lumMod val="95000"/>
-                  </a:schemeClr>
-                </a:solidFill>
-                <a:latin typeface="Times New Roman" panose="02020603050405020304" pitchFamily="18" charset="0"/>
-                <a:cs typeface="Times New Roman" panose="02020603050405020304" pitchFamily="18" charset="0"/>
-              </a:rPr>
-              <a:t>Problem Description</a:t>
-            </a:r>
-          </a:p>
-        </p:txBody>
-      </p:sp>
-      <p:sp>
-        <p:nvSpPr>
-          <p:cNvPr id="22" name="TextBox 21">
-            <a:extLst>
-              <a:ext uri="{FF2B5EF4-FFF2-40B4-BE49-F238E27FC236}">
-                <a16:creationId xmlns:a16="http://schemas.microsoft.com/office/drawing/2014/main" id="{A0D85028-A175-46DC-E15D-CE3C60C0EC7F}"/>
-              </a:ext>
-            </a:extLst>
-          </p:cNvPr>
-          <p:cNvSpPr txBox="1"/>
-          <p:nvPr/>
-        </p:nvSpPr>
-        <p:spPr>
-          <a:xfrm>
-            <a:off x="18277080" y="13363904"/>
-            <a:ext cx="6248400" cy="646331"/>
-          </a:xfrm>
-          <a:prstGeom prst="rect">
-            <a:avLst/>
-          </a:prstGeom>
-          <a:noFill/>
-        </p:spPr>
-        <p:txBody>
-          <a:bodyPr wrap="square" rtlCol="0">
-            <a:spAutoFit/>
-          </a:bodyPr>
-          <a:lstStyle/>
-          <a:p>
-            <a:pPr algn="ctr"/>
-            <a:r>
-              <a:rPr lang="en-US" sz="3600" dirty="0">
-                <a:solidFill>
-                  <a:schemeClr val="bg1">
-                    <a:lumMod val="95000"/>
-                  </a:schemeClr>
-                </a:solidFill>
-                <a:latin typeface="Times New Roman" panose="02020603050405020304" pitchFamily="18" charset="0"/>
-                <a:cs typeface="Times New Roman" panose="02020603050405020304" pitchFamily="18" charset="0"/>
-              </a:rPr>
-              <a:t>Problem Description</a:t>
-            </a:r>
-          </a:p>
-        </p:txBody>
-      </p:sp>
-      <p:sp>
-        <p:nvSpPr>
-          <p:cNvPr id="23" name="TextBox 22">
-            <a:extLst>
-              <a:ext uri="{FF2B5EF4-FFF2-40B4-BE49-F238E27FC236}">
-                <a16:creationId xmlns:a16="http://schemas.microsoft.com/office/drawing/2014/main" id="{B3FF5BE7-6BC9-127E-4BAB-DE2098BFACAA}"/>
-              </a:ext>
-            </a:extLst>
-          </p:cNvPr>
-          <p:cNvSpPr txBox="1"/>
-          <p:nvPr/>
-        </p:nvSpPr>
-        <p:spPr>
-          <a:xfrm>
-            <a:off x="32087523" y="5586385"/>
-            <a:ext cx="6248400" cy="646331"/>
-          </a:xfrm>
-          <a:prstGeom prst="rect">
-            <a:avLst/>
-          </a:prstGeom>
-          <a:noFill/>
-        </p:spPr>
-        <p:txBody>
-          <a:bodyPr wrap="square" rtlCol="0">
-            <a:spAutoFit/>
-          </a:bodyPr>
-          <a:lstStyle/>
-          <a:p>
-            <a:pPr algn="ctr"/>
-            <a:r>
-              <a:rPr lang="en-US" sz="3600" dirty="0">
-                <a:solidFill>
-                  <a:schemeClr val="bg1">
-                    <a:lumMod val="95000"/>
-                  </a:schemeClr>
-                </a:solidFill>
-                <a:latin typeface="Times New Roman" panose="02020603050405020304" pitchFamily="18" charset="0"/>
-                <a:cs typeface="Times New Roman" panose="02020603050405020304" pitchFamily="18" charset="0"/>
-              </a:rPr>
-              <a:t>Problem Description</a:t>
-            </a:r>
-          </a:p>
-        </p:txBody>
-      </p:sp>
-      <p:sp>
-        <p:nvSpPr>
-          <p:cNvPr id="24" name="TextBox 23">
-            <a:extLst>
-              <a:ext uri="{FF2B5EF4-FFF2-40B4-BE49-F238E27FC236}">
-                <a16:creationId xmlns:a16="http://schemas.microsoft.com/office/drawing/2014/main" id="{E13DAA02-DDB4-C002-F42E-15C20B7EB10E}"/>
-              </a:ext>
-            </a:extLst>
-          </p:cNvPr>
-          <p:cNvSpPr txBox="1"/>
-          <p:nvPr/>
-        </p:nvSpPr>
-        <p:spPr>
-          <a:xfrm>
-            <a:off x="4467840" y="13919424"/>
-            <a:ext cx="6248400" cy="646331"/>
-          </a:xfrm>
-          <a:prstGeom prst="rect">
-            <a:avLst/>
-          </a:prstGeom>
-          <a:noFill/>
-        </p:spPr>
-        <p:txBody>
-          <a:bodyPr wrap="square" rtlCol="0">
-            <a:spAutoFit/>
-          </a:bodyPr>
-          <a:lstStyle/>
-          <a:p>
-            <a:pPr algn="ctr"/>
-            <a:r>
-              <a:rPr lang="en-US" sz="3600" dirty="0">
-                <a:solidFill>
-                  <a:schemeClr val="bg1">
-                    <a:lumMod val="95000"/>
-                  </a:schemeClr>
-                </a:solidFill>
-                <a:latin typeface="Times New Roman" panose="02020603050405020304" pitchFamily="18" charset="0"/>
-                <a:cs typeface="Times New Roman" panose="02020603050405020304" pitchFamily="18" charset="0"/>
-              </a:rPr>
-              <a:t>Problem Description</a:t>
-            </a:r>
-          </a:p>
-        </p:txBody>
-      </p:sp>
-      <p:sp>
-        <p:nvSpPr>
-          <p:cNvPr id="25" name="TextBox 24">
-            <a:extLst>
-              <a:ext uri="{FF2B5EF4-FFF2-40B4-BE49-F238E27FC236}">
-                <a16:creationId xmlns:a16="http://schemas.microsoft.com/office/drawing/2014/main" id="{BD701C71-EB35-84FC-4D0B-06F53FC135B6}"/>
-              </a:ext>
-            </a:extLst>
-          </p:cNvPr>
-          <p:cNvSpPr txBox="1"/>
-          <p:nvPr/>
-        </p:nvSpPr>
-        <p:spPr>
-          <a:xfrm>
-            <a:off x="4467840" y="21056244"/>
-            <a:ext cx="6248400" cy="646331"/>
-          </a:xfrm>
-          <a:prstGeom prst="rect">
-            <a:avLst/>
-          </a:prstGeom>
-          <a:noFill/>
-        </p:spPr>
-        <p:txBody>
-          <a:bodyPr wrap="square" rtlCol="0">
-            <a:spAutoFit/>
-          </a:bodyPr>
-          <a:lstStyle/>
-          <a:p>
-            <a:pPr algn="ctr"/>
-            <a:r>
-              <a:rPr lang="en-US" sz="3600" dirty="0">
-                <a:solidFill>
-                  <a:schemeClr val="bg1">
-                    <a:lumMod val="95000"/>
-                  </a:schemeClr>
-                </a:solidFill>
-                <a:latin typeface="Times New Roman" panose="02020603050405020304" pitchFamily="18" charset="0"/>
-                <a:cs typeface="Times New Roman" panose="02020603050405020304" pitchFamily="18" charset="0"/>
-              </a:rPr>
-              <a:t>Problem Description</a:t>
-            </a:r>
-          </a:p>
-        </p:txBody>
-      </p:sp>
-      <p:sp>
-        <p:nvSpPr>
-          <p:cNvPr id="26" name="TextBox 25">
-            <a:extLst>
-              <a:ext uri="{FF2B5EF4-FFF2-40B4-BE49-F238E27FC236}">
-                <a16:creationId xmlns:a16="http://schemas.microsoft.com/office/drawing/2014/main" id="{420F3729-213D-583C-3D24-4F494730B982}"/>
-              </a:ext>
-            </a:extLst>
-          </p:cNvPr>
-          <p:cNvSpPr txBox="1"/>
-          <p:nvPr/>
-        </p:nvSpPr>
-        <p:spPr>
-          <a:xfrm>
-            <a:off x="18277080" y="21046554"/>
-            <a:ext cx="6248400" cy="646331"/>
-          </a:xfrm>
-          <a:prstGeom prst="rect">
-            <a:avLst/>
-          </a:prstGeom>
-          <a:noFill/>
-        </p:spPr>
-        <p:txBody>
-          <a:bodyPr wrap="square" rtlCol="0">
-            <a:spAutoFit/>
-          </a:bodyPr>
-          <a:lstStyle/>
-          <a:p>
-            <a:pPr algn="ctr"/>
-            <a:r>
-              <a:rPr lang="en-US" sz="3600" dirty="0">
-                <a:solidFill>
-                  <a:schemeClr val="bg1">
-                    <a:lumMod val="95000"/>
-                  </a:schemeClr>
-                </a:solidFill>
-                <a:latin typeface="Times New Roman" panose="02020603050405020304" pitchFamily="18" charset="0"/>
-                <a:cs typeface="Times New Roman" panose="02020603050405020304" pitchFamily="18" charset="0"/>
-              </a:rPr>
-              <a:t>Problem Description</a:t>
-            </a:r>
-          </a:p>
-        </p:txBody>
-      </p:sp>
-      <p:sp>
-        <p:nvSpPr>
-          <p:cNvPr id="27" name="TextBox 26">
-            <a:extLst>
-              <a:ext uri="{FF2B5EF4-FFF2-40B4-BE49-F238E27FC236}">
-                <a16:creationId xmlns:a16="http://schemas.microsoft.com/office/drawing/2014/main" id="{0D6A186A-B39E-4CA1-8647-5C2E5F28D30F}"/>
-              </a:ext>
-            </a:extLst>
-          </p:cNvPr>
-          <p:cNvSpPr txBox="1"/>
-          <p:nvPr/>
-        </p:nvSpPr>
-        <p:spPr>
-          <a:xfrm>
-            <a:off x="32087523" y="13386714"/>
-            <a:ext cx="6248400" cy="646331"/>
-          </a:xfrm>
-          <a:prstGeom prst="rect">
-            <a:avLst/>
-          </a:prstGeom>
-          <a:noFill/>
-        </p:spPr>
-        <p:txBody>
-          <a:bodyPr wrap="square" rtlCol="0">
-            <a:spAutoFit/>
-          </a:bodyPr>
-          <a:lstStyle/>
-          <a:p>
-            <a:pPr algn="ctr"/>
-            <a:r>
-              <a:rPr lang="en-US" sz="3600" dirty="0">
-                <a:solidFill>
-                  <a:schemeClr val="bg1">
-                    <a:lumMod val="95000"/>
-                  </a:schemeClr>
-                </a:solidFill>
-                <a:latin typeface="Times New Roman" panose="02020603050405020304" pitchFamily="18" charset="0"/>
-                <a:cs typeface="Times New Roman" panose="02020603050405020304" pitchFamily="18" charset="0"/>
-              </a:rPr>
-              <a:t>Problem Description</a:t>
-            </a:r>
-          </a:p>
-        </p:txBody>
-      </p:sp>
-      <p:sp>
-        <p:nvSpPr>
-          <p:cNvPr id="28" name="TextBox 27">
-            <a:extLst>
-              <a:ext uri="{FF2B5EF4-FFF2-40B4-BE49-F238E27FC236}">
-                <a16:creationId xmlns:a16="http://schemas.microsoft.com/office/drawing/2014/main" id="{844868E0-4869-3D6C-023F-CC64E0B57197}"/>
-              </a:ext>
-            </a:extLst>
-          </p:cNvPr>
-          <p:cNvSpPr txBox="1"/>
-          <p:nvPr/>
-        </p:nvSpPr>
-        <p:spPr>
-          <a:xfrm>
-            <a:off x="32087523" y="18245394"/>
-            <a:ext cx="6248400" cy="646331"/>
-          </a:xfrm>
-          <a:prstGeom prst="rect">
-            <a:avLst/>
-          </a:prstGeom>
-          <a:noFill/>
-        </p:spPr>
-        <p:txBody>
-          <a:bodyPr wrap="square" rtlCol="0">
-            <a:spAutoFit/>
-          </a:bodyPr>
-          <a:lstStyle/>
-          <a:p>
-            <a:pPr algn="ctr"/>
-            <a:r>
-              <a:rPr lang="en-US" sz="3600" dirty="0">
-                <a:solidFill>
-                  <a:schemeClr val="bg1">
-                    <a:lumMod val="95000"/>
-                  </a:schemeClr>
-                </a:solidFill>
-                <a:latin typeface="Times New Roman" panose="02020603050405020304" pitchFamily="18" charset="0"/>
-                <a:cs typeface="Times New Roman" panose="02020603050405020304" pitchFamily="18" charset="0"/>
-              </a:rPr>
-              <a:t>Problem Description</a:t>
-            </a:r>
-          </a:p>
-        </p:txBody>
-      </p:sp>
-      <p:sp>
-        <p:nvSpPr>
-          <p:cNvPr id="29" name="TextBox 28">
-            <a:extLst>
-              <a:ext uri="{FF2B5EF4-FFF2-40B4-BE49-F238E27FC236}">
-                <a16:creationId xmlns:a16="http://schemas.microsoft.com/office/drawing/2014/main" id="{AB5697B3-654F-AA48-D56E-F9A82C352AB2}"/>
-              </a:ext>
-            </a:extLst>
-          </p:cNvPr>
-          <p:cNvSpPr txBox="1"/>
-          <p:nvPr/>
-        </p:nvSpPr>
-        <p:spPr>
-          <a:xfrm>
-            <a:off x="32087523" y="23591754"/>
-            <a:ext cx="6248400" cy="646331"/>
-          </a:xfrm>
-          <a:prstGeom prst="rect">
-            <a:avLst/>
-          </a:prstGeom>
-          <a:noFill/>
-        </p:spPr>
-        <p:txBody>
-          <a:bodyPr wrap="square" rtlCol="0">
-            <a:spAutoFit/>
-          </a:bodyPr>
-          <a:lstStyle/>
-          <a:p>
-            <a:pPr algn="ctr"/>
-            <a:r>
-              <a:rPr lang="en-US" sz="3600" dirty="0">
-                <a:solidFill>
-                  <a:schemeClr val="bg1">
-                    <a:lumMod val="95000"/>
-                  </a:schemeClr>
-                </a:solidFill>
-                <a:latin typeface="Times New Roman" panose="02020603050405020304" pitchFamily="18" charset="0"/>
-                <a:cs typeface="Times New Roman" panose="02020603050405020304" pitchFamily="18" charset="0"/>
-              </a:rPr>
-              <a:t>Problem Description</a:t>
+              <a:t>References</a:t>
             </a:r>
           </a:p>
         </p:txBody>

</xml_diff>

<commit_message>
Poster changes: finished Self-CHOP module
</commit_message>
<xml_diff>
--- a/Documents/G7-a0_landscape-projectposter.pptx
+++ b/Documents/G7-a0_landscape-projectposter.pptx
@@ -3493,14 +3493,14 @@
                 <a:latin typeface="Times New Roman" panose="02020603050405020304" pitchFamily="18" charset="0"/>
                 <a:cs typeface="Times New Roman" panose="02020603050405020304" pitchFamily="18" charset="0"/>
               </a:rPr>
-              <a:t>Reliability of Raspberry Pi Websites (</a:t>
+              <a:t>Reliability of Raspberry Pi Website (</a:t>
             </a:r>
             <a:r>
               <a:rPr lang="en-US" sz="3600" b="1" dirty="0" err="1">
                 <a:latin typeface="Times New Roman" panose="02020603050405020304" pitchFamily="18" charset="0"/>
                 <a:cs typeface="Times New Roman" panose="02020603050405020304" pitchFamily="18" charset="0"/>
               </a:rPr>
-              <a:t>RPiW</a:t>
+              <a:t>RPiWeb</a:t>
             </a:r>
             <a:r>
               <a:rPr lang="en-US" sz="3600" b="1" dirty="0">
@@ -6366,7 +6366,7 @@
         <p:spPr>
           <a:xfrm>
             <a:off x="15264720" y="27536172"/>
-            <a:ext cx="12273120" cy="825867"/>
+            <a:ext cx="12273120" cy="1990288"/>
           </a:xfrm>
           <a:prstGeom prst="rect">
             <a:avLst/>
@@ -6379,7 +6379,7 @@
           </a:bodyPr>
           <a:lstStyle/>
           <a:p>
-            <a:pPr indent="0">
+            <a:pPr indent="0" algn="just">
               <a:spcBef>
                 <a:spcPts val="1417"/>
               </a:spcBef>
@@ -6387,28 +6387,28 @@
               <a:buNone/>
             </a:pPr>
             <a:r>
-              <a:rPr lang="en-GB" sz="1800" b="1" dirty="0">
+              <a:rPr lang="en-GB" sz="2000" b="1" dirty="0">
                 <a:latin typeface="Times New Roman" panose="02020603050405020304" pitchFamily="18" charset="0"/>
                 <a:cs typeface="Times New Roman" panose="02020603050405020304" pitchFamily="18" charset="0"/>
               </a:rPr>
               <a:t>[1]</a:t>
             </a:r>
             <a:r>
-              <a:rPr lang="en-GB" sz="1800" dirty="0">
+              <a:rPr lang="en-GB" sz="2000" dirty="0">
                 <a:latin typeface="Times New Roman" panose="02020603050405020304" pitchFamily="18" charset="0"/>
                 <a:cs typeface="Times New Roman" panose="02020603050405020304" pitchFamily="18" charset="0"/>
               </a:rPr>
               <a:t> J. O. Kephart and D. M. Chess, "The Vision of Autonomic Computing," </a:t>
             </a:r>
             <a:r>
-              <a:rPr lang="en-GB" sz="1800" i="1" dirty="0">
+              <a:rPr lang="en-GB" sz="2000" i="1" dirty="0">
                 <a:latin typeface="Times New Roman" panose="02020603050405020304" pitchFamily="18" charset="0"/>
                 <a:cs typeface="Times New Roman" panose="02020603050405020304" pitchFamily="18" charset="0"/>
               </a:rPr>
               <a:t>IEEE Computer Magazine</a:t>
             </a:r>
             <a:r>
-              <a:rPr lang="en-GB" sz="1800" dirty="0">
+              <a:rPr lang="en-GB" sz="2000" dirty="0">
                 <a:latin typeface="Times New Roman" panose="02020603050405020304" pitchFamily="18" charset="0"/>
                 <a:cs typeface="Times New Roman" panose="02020603050405020304" pitchFamily="18" charset="0"/>
               </a:rPr>
@@ -6416,14 +6416,65 @@
             </a:r>
           </a:p>
           <a:p>
-            <a:pPr indent="0">
+            <a:pPr indent="0" algn="just">
               <a:spcBef>
                 <a:spcPts val="1417"/>
               </a:spcBef>
               <a:buFont typeface="Arial" panose="020B0604020202020204" pitchFamily="34" charset="0"/>
               <a:buNone/>
             </a:pPr>
-            <a:endParaRPr lang="en-CA" spc="-1" dirty="0">
+            <a:r>
+              <a:rPr lang="en-GB" sz="2000" b="1" dirty="0">
+                <a:latin typeface="Times New Roman" panose="02020603050405020304" pitchFamily="18" charset="0"/>
+                <a:cs typeface="Times New Roman" panose="02020603050405020304" pitchFamily="18" charset="0"/>
+              </a:rPr>
+              <a:t>[2]</a:t>
+            </a:r>
+            <a:r>
+              <a:rPr lang="en-GB" sz="2000" dirty="0">
+                <a:latin typeface="Times New Roman" panose="02020603050405020304" pitchFamily="18" charset="0"/>
+                <a:cs typeface="Times New Roman" panose="02020603050405020304" pitchFamily="18" charset="0"/>
+              </a:rPr>
+              <a:t> L. </a:t>
+            </a:r>
+            <a:r>
+              <a:rPr lang="en-GB" sz="2000" dirty="0" err="1">
+                <a:latin typeface="Times New Roman" panose="02020603050405020304" pitchFamily="18" charset="0"/>
+                <a:cs typeface="Times New Roman" panose="02020603050405020304" pitchFamily="18" charset="0"/>
+              </a:rPr>
+              <a:t>Tahvildari</a:t>
+            </a:r>
+            <a:r>
+              <a:rPr lang="en-GB" sz="2000" dirty="0">
+                <a:latin typeface="Times New Roman" panose="02020603050405020304" pitchFamily="18" charset="0"/>
+                <a:cs typeface="Times New Roman" panose="02020603050405020304" pitchFamily="18" charset="0"/>
+              </a:rPr>
+              <a:t>, </a:t>
+            </a:r>
+            <a:r>
+              <a:rPr lang="en-GB" sz="2000" i="1" dirty="0">
+                <a:latin typeface="Times New Roman" panose="02020603050405020304" pitchFamily="18" charset="0"/>
+                <a:cs typeface="Times New Roman" panose="02020603050405020304" pitchFamily="18" charset="0"/>
+              </a:rPr>
+              <a:t>ECE750-T37: Engineering Self-Adaptive Software Systems, Lecture 1</a:t>
+            </a:r>
+            <a:r>
+              <a:rPr lang="en-GB" sz="2000" dirty="0">
+                <a:latin typeface="Times New Roman" panose="02020603050405020304" pitchFamily="18" charset="0"/>
+                <a:cs typeface="Times New Roman" panose="02020603050405020304" pitchFamily="18" charset="0"/>
+              </a:rPr>
+              <a:t>, Dept. of Elect. and Comp. Eng., University of Waterloo, 2024</a:t>
+            </a:r>
+          </a:p>
+          <a:p>
+            <a:pPr indent="0" algn="just">
+              <a:spcBef>
+                <a:spcPts val="1417"/>
+              </a:spcBef>
+              <a:buFont typeface="Arial" panose="020B0604020202020204" pitchFamily="34" charset="0"/>
+              <a:buNone/>
+            </a:pPr>
+            <a:endParaRPr lang="en-CA" sz="2000" spc="-1" dirty="0">
               <a:solidFill>
                 <a:srgbClr val="000000"/>
               </a:solidFill>
@@ -6455,14 +6506,159 @@
         </p:blipFill>
         <p:spPr>
           <a:xfrm>
-            <a:off x="3565106" y="14629610"/>
-            <a:ext cx="7880134" cy="4059463"/>
+            <a:off x="3837789" y="14660566"/>
+            <a:ext cx="7270534" cy="3745427"/>
           </a:xfrm>
           <a:prstGeom prst="rect">
             <a:avLst/>
           </a:prstGeom>
         </p:spPr>
       </p:pic>
+      <p:sp>
+        <p:nvSpPr>
+          <p:cNvPr id="4" name="TextBox 3">
+            <a:extLst>
+              <a:ext uri="{FF2B5EF4-FFF2-40B4-BE49-F238E27FC236}">
+                <a16:creationId xmlns:a16="http://schemas.microsoft.com/office/drawing/2014/main" id="{EA1D337B-8993-1038-1473-7DCBE47C15D9}"/>
+              </a:ext>
+            </a:extLst>
+          </p:cNvPr>
+          <p:cNvSpPr txBox="1"/>
+          <p:nvPr/>
+        </p:nvSpPr>
+        <p:spPr>
+          <a:xfrm>
+            <a:off x="1455480" y="18747920"/>
+            <a:ext cx="12273120" cy="2308324"/>
+          </a:xfrm>
+          <a:prstGeom prst="rect">
+            <a:avLst/>
+          </a:prstGeom>
+          <a:noFill/>
+        </p:spPr>
+        <p:txBody>
+          <a:bodyPr wrap="square" numCol="2" rtlCol="0" anchor="ctr">
+            <a:spAutoFit/>
+          </a:bodyPr>
+          <a:lstStyle/>
+          <a:p>
+            <a:pPr algn="ctr"/>
+            <a:r>
+              <a:rPr lang="en-US" sz="2400" b="1" dirty="0">
+                <a:latin typeface="Times New Roman" panose="02020603050405020304" pitchFamily="18" charset="0"/>
+                <a:cs typeface="Times New Roman" panose="02020603050405020304" pitchFamily="18" charset="0"/>
+              </a:rPr>
+              <a:t>Self-Configuration</a:t>
+            </a:r>
+          </a:p>
+          <a:p>
+            <a:pPr marL="285750" indent="-285750" algn="ctr">
+              <a:buFont typeface="Arial" panose="020B0604020202020204" pitchFamily="34" charset="0"/>
+              <a:buChar char="•"/>
+            </a:pPr>
+            <a:r>
+              <a:rPr lang="en-US" sz="2400" dirty="0">
+                <a:latin typeface="Times New Roman" panose="02020603050405020304" pitchFamily="18" charset="0"/>
+                <a:cs typeface="Times New Roman" panose="02020603050405020304" pitchFamily="18" charset="0"/>
+              </a:rPr>
+              <a:t>Adjust CPU clock speeds dynamically</a:t>
+            </a:r>
+          </a:p>
+          <a:p>
+            <a:pPr algn="ctr"/>
+            <a:endParaRPr lang="en-US" sz="2400" dirty="0">
+              <a:latin typeface="Times New Roman" panose="02020603050405020304" pitchFamily="18" charset="0"/>
+              <a:cs typeface="Times New Roman" panose="02020603050405020304" pitchFamily="18" charset="0"/>
+            </a:endParaRPr>
+          </a:p>
+          <a:p>
+            <a:pPr algn="ctr"/>
+            <a:r>
+              <a:rPr lang="en-US" sz="2400" b="1" dirty="0">
+                <a:latin typeface="Times New Roman" panose="02020603050405020304" pitchFamily="18" charset="0"/>
+                <a:cs typeface="Times New Roman" panose="02020603050405020304" pitchFamily="18" charset="0"/>
+              </a:rPr>
+              <a:t>Self-Optimizing</a:t>
+            </a:r>
+          </a:p>
+          <a:p>
+            <a:pPr marL="285750" indent="-285750" algn="ctr">
+              <a:buFont typeface="Arial" panose="020B0604020202020204" pitchFamily="34" charset="0"/>
+              <a:buChar char="•"/>
+            </a:pPr>
+            <a:r>
+              <a:rPr lang="en-US" sz="2400" dirty="0">
+                <a:latin typeface="Times New Roman" panose="02020603050405020304" pitchFamily="18" charset="0"/>
+                <a:cs typeface="Times New Roman" panose="02020603050405020304" pitchFamily="18" charset="0"/>
+              </a:rPr>
+              <a:t>Content degradation</a:t>
+            </a:r>
+          </a:p>
+          <a:p>
+            <a:pPr algn="ctr"/>
+            <a:endParaRPr lang="en-US" sz="2400" b="1" dirty="0">
+              <a:latin typeface="Times New Roman" panose="02020603050405020304" pitchFamily="18" charset="0"/>
+              <a:cs typeface="Times New Roman" panose="02020603050405020304" pitchFamily="18" charset="0"/>
+            </a:endParaRPr>
+          </a:p>
+          <a:p>
+            <a:pPr algn="ctr"/>
+            <a:r>
+              <a:rPr lang="en-US" sz="2400" b="1" dirty="0">
+                <a:latin typeface="Times New Roman" panose="02020603050405020304" pitchFamily="18" charset="0"/>
+                <a:cs typeface="Times New Roman" panose="02020603050405020304" pitchFamily="18" charset="0"/>
+              </a:rPr>
+              <a:t>Self-Healing</a:t>
+            </a:r>
+          </a:p>
+          <a:p>
+            <a:pPr marL="285750" indent="-285750" algn="ctr">
+              <a:buFont typeface="Arial" panose="020B0604020202020204" pitchFamily="34" charset="0"/>
+              <a:buChar char="•"/>
+            </a:pPr>
+            <a:r>
+              <a:rPr lang="en-US" sz="2400" dirty="0">
+                <a:latin typeface="Times New Roman" panose="02020603050405020304" pitchFamily="18" charset="0"/>
+                <a:cs typeface="Times New Roman" panose="02020603050405020304" pitchFamily="18" charset="0"/>
+              </a:rPr>
+              <a:t>Crash recovery via watchdog mechanism</a:t>
+            </a:r>
+          </a:p>
+          <a:p>
+            <a:pPr marL="285750" indent="-285750" algn="ctr">
+              <a:buFont typeface="Arial" panose="020B0604020202020204" pitchFamily="34" charset="0"/>
+              <a:buChar char="•"/>
+            </a:pPr>
+            <a:endParaRPr lang="en-US" sz="2400" dirty="0">
+              <a:latin typeface="Times New Roman" panose="02020603050405020304" pitchFamily="18" charset="0"/>
+              <a:cs typeface="Times New Roman" panose="02020603050405020304" pitchFamily="18" charset="0"/>
+            </a:endParaRPr>
+          </a:p>
+          <a:p>
+            <a:pPr algn="ctr"/>
+            <a:r>
+              <a:rPr lang="en-US" sz="2400" b="1" dirty="0">
+                <a:latin typeface="Times New Roman" panose="02020603050405020304" pitchFamily="18" charset="0"/>
+                <a:cs typeface="Times New Roman" panose="02020603050405020304" pitchFamily="18" charset="0"/>
+              </a:rPr>
+              <a:t>Self-Protection</a:t>
+            </a:r>
+          </a:p>
+          <a:p>
+            <a:pPr marL="285750" indent="-285750" algn="ctr">
+              <a:buFont typeface="Arial" panose="020B0604020202020204" pitchFamily="34" charset="0"/>
+              <a:buChar char="•"/>
+            </a:pPr>
+            <a:r>
+              <a:rPr lang="en-US" sz="2400" dirty="0">
+                <a:latin typeface="Times New Roman" panose="02020603050405020304" pitchFamily="18" charset="0"/>
+                <a:cs typeface="Times New Roman" panose="02020603050405020304" pitchFamily="18" charset="0"/>
+              </a:rPr>
+              <a:t>Priority-based fallback pages</a:t>
+            </a:r>
+          </a:p>
+        </p:txBody>
+      </p:sp>
     </p:spTree>
   </p:cSld>
   <p:clrMapOvr>

</xml_diff>